<commit_message>
updated week 3 lectures
</commit_message>
<xml_diff>
--- a/Slides/05_EDUC_6050_2018.pptx
+++ b/Slides/05_EDUC_6050_2018.pptx
@@ -5,7 +5,7 @@
     <p:sldMasterId id="2147483648" r:id="rId1"/>
   </p:sldMasterIdLst>
   <p:notesMasterIdLst>
-    <p:notesMasterId r:id="rId53"/>
+    <p:notesMasterId r:id="rId54"/>
   </p:notesMasterIdLst>
   <p:sldIdLst>
     <p:sldId id="256" r:id="rId2"/>
@@ -59,6 +59,7 @@
     <p:sldId id="348" r:id="rId50"/>
     <p:sldId id="289" r:id="rId51"/>
     <p:sldId id="290" r:id="rId52"/>
+    <p:sldId id="349" r:id="rId53"/>
   </p:sldIdLst>
   <p:sldSz cx="12192000" cy="6858000"/>
   <p:notesSz cx="6858000" cy="9144000"/>
@@ -247,7 +248,7 @@
           <a:p>
             <a:fld id="{E2EB8C27-4EA0-7247-87A3-872976A07B51}" type="datetimeFigureOut">
               <a:rPr lang="en-US" smtClean="0"/>
-              <a:t>2/13/18</a:t>
+              <a:t>12/11/19</a:t>
             </a:fld>
             <a:endParaRPr lang="en-US"/>
           </a:p>
@@ -3949,6 +3950,90 @@
 </p:notes>
 </file>
 
+<file path=ppt/notesSlides/notesSlide46.xml><?xml version="1.0" encoding="utf-8"?>
+<p:notes xmlns:a="http://schemas.openxmlformats.org/drawingml/2006/main" xmlns:r="http://schemas.openxmlformats.org/officeDocument/2006/relationships" xmlns:p="http://schemas.openxmlformats.org/presentationml/2006/main">
+  <p:cSld>
+    <p:spTree>
+      <p:nvGrpSpPr>
+        <p:cNvPr id="1" name=""/>
+        <p:cNvGrpSpPr/>
+        <p:nvPr/>
+      </p:nvGrpSpPr>
+      <p:grpSpPr>
+        <a:xfrm>
+          <a:off x="0" y="0"/>
+          <a:ext cx="0" cy="0"/>
+          <a:chOff x="0" y="0"/>
+          <a:chExt cx="0" cy="0"/>
+        </a:xfrm>
+      </p:grpSpPr>
+      <p:sp>
+        <p:nvSpPr>
+          <p:cNvPr id="2" name="Slide Image Placeholder 1"/>
+          <p:cNvSpPr>
+            <a:spLocks noGrp="1" noRot="1" noChangeAspect="1"/>
+          </p:cNvSpPr>
+          <p:nvPr>
+            <p:ph type="sldImg"/>
+          </p:nvPr>
+        </p:nvSpPr>
+        <p:spPr/>
+      </p:sp>
+      <p:sp>
+        <p:nvSpPr>
+          <p:cNvPr id="3" name="Notes Placeholder 2"/>
+          <p:cNvSpPr>
+            <a:spLocks noGrp="1"/>
+          </p:cNvSpPr>
+          <p:nvPr>
+            <p:ph type="body" idx="1"/>
+          </p:nvPr>
+        </p:nvSpPr>
+        <p:spPr/>
+        <p:txBody>
+          <a:bodyPr/>
+          <a:lstStyle/>
+          <a:p>
+            <a:endParaRPr lang="en-US" dirty="0"/>
+          </a:p>
+        </p:txBody>
+      </p:sp>
+      <p:sp>
+        <p:nvSpPr>
+          <p:cNvPr id="4" name="Slide Number Placeholder 3"/>
+          <p:cNvSpPr>
+            <a:spLocks noGrp="1"/>
+          </p:cNvSpPr>
+          <p:nvPr>
+            <p:ph type="sldNum" sz="quarter" idx="10"/>
+          </p:nvPr>
+        </p:nvSpPr>
+        <p:spPr/>
+        <p:txBody>
+          <a:bodyPr/>
+          <a:lstStyle/>
+          <a:p>
+            <a:fld id="{AECF59C2-7033-4B4D-ACA3-71A130EDE93E}" type="slidenum">
+              <a:rPr lang="en-US" smtClean="0"/>
+              <a:t>52</a:t>
+            </a:fld>
+            <a:endParaRPr lang="en-US"/>
+          </a:p>
+        </p:txBody>
+      </p:sp>
+    </p:spTree>
+    <p:extLst>
+      <p:ext uri="{BB962C8B-B14F-4D97-AF65-F5344CB8AC3E}">
+        <p14:creationId xmlns:p14="http://schemas.microsoft.com/office/powerpoint/2010/main" val="2279411384"/>
+      </p:ext>
+    </p:extLst>
+  </p:cSld>
+  <p:clrMapOvr>
+    <a:masterClrMapping/>
+  </p:clrMapOvr>
+</p:notes>
+</file>
+
 <file path=ppt/notesSlides/notesSlide5.xml><?xml version="1.0" encoding="utf-8"?>
 <p:notes xmlns:a="http://schemas.openxmlformats.org/drawingml/2006/main" xmlns:r="http://schemas.openxmlformats.org/officeDocument/2006/relationships" xmlns:p="http://schemas.openxmlformats.org/presentationml/2006/main">
   <p:cSld>
@@ -4501,7 +4586,7 @@
           <a:p>
             <a:fld id="{2BEF6D73-E719-D849-B192-46101C5BDE90}" type="datetime1">
               <a:rPr lang="en-US" smtClean="0"/>
-              <a:t>2/13/18</a:t>
+              <a:t>12/11/19</a:t>
             </a:fld>
             <a:endParaRPr lang="en-US"/>
           </a:p>
@@ -4669,7 +4754,7 @@
           <a:p>
             <a:fld id="{217F9701-0A79-F944-95C4-63D074BCD5FE}" type="datetime1">
               <a:rPr lang="en-US" smtClean="0"/>
-              <a:t>2/13/18</a:t>
+              <a:t>12/11/19</a:t>
             </a:fld>
             <a:endParaRPr lang="en-US"/>
           </a:p>
@@ -4847,7 +4932,7 @@
           <a:p>
             <a:fld id="{8A1E0CA4-DAFA-6D46-8CB2-2C9884C33B19}" type="datetime1">
               <a:rPr lang="en-US" smtClean="0"/>
-              <a:t>2/13/18</a:t>
+              <a:t>12/11/19</a:t>
             </a:fld>
             <a:endParaRPr lang="en-US"/>
           </a:p>
@@ -5015,7 +5100,7 @@
           <a:p>
             <a:fld id="{2EDE969C-4E88-FD4D-B0FD-C205835C558E}" type="datetime1">
               <a:rPr lang="en-US" smtClean="0"/>
-              <a:t>2/13/18</a:t>
+              <a:t>12/11/19</a:t>
             </a:fld>
             <a:endParaRPr lang="en-US"/>
           </a:p>
@@ -5260,7 +5345,7 @@
           <a:p>
             <a:fld id="{6EB2FD85-1BA6-C144-9430-792891429B46}" type="datetime1">
               <a:rPr lang="en-US" smtClean="0"/>
-              <a:t>2/13/18</a:t>
+              <a:t>12/11/19</a:t>
             </a:fld>
             <a:endParaRPr lang="en-US"/>
           </a:p>
@@ -5489,7 +5574,7 @@
           <a:p>
             <a:fld id="{566BD6FA-46B1-AB4D-BA89-52D1F1EDB7DC}" type="datetime1">
               <a:rPr lang="en-US" smtClean="0"/>
-              <a:t>2/13/18</a:t>
+              <a:t>12/11/19</a:t>
             </a:fld>
             <a:endParaRPr lang="en-US"/>
           </a:p>
@@ -5853,7 +5938,7 @@
           <a:p>
             <a:fld id="{DC6F0F6F-40DD-C041-8CA9-F3B7FE603DF0}" type="datetime1">
               <a:rPr lang="en-US" smtClean="0"/>
-              <a:t>2/13/18</a:t>
+              <a:t>12/11/19</a:t>
             </a:fld>
             <a:endParaRPr lang="en-US"/>
           </a:p>
@@ -5970,7 +6055,7 @@
           <a:p>
             <a:fld id="{79BE8225-12C7-9541-8776-7D580B3D5DF4}" type="datetime1">
               <a:rPr lang="en-US" smtClean="0"/>
-              <a:t>2/13/18</a:t>
+              <a:t>12/11/19</a:t>
             </a:fld>
             <a:endParaRPr lang="en-US"/>
           </a:p>
@@ -6065,7 +6150,7 @@
           <a:p>
             <a:fld id="{0BC48ADA-5976-EF4F-970E-AF67408D4544}" type="datetime1">
               <a:rPr lang="en-US" smtClean="0"/>
-              <a:t>2/13/18</a:t>
+              <a:t>12/11/19</a:t>
             </a:fld>
             <a:endParaRPr lang="en-US"/>
           </a:p>
@@ -6340,7 +6425,7 @@
           <a:p>
             <a:fld id="{CC4350B1-E69C-BF40-8DA9-7B6511B1163C}" type="datetime1">
               <a:rPr lang="en-US" smtClean="0"/>
-              <a:t>2/13/18</a:t>
+              <a:t>12/11/19</a:t>
             </a:fld>
             <a:endParaRPr lang="en-US"/>
           </a:p>
@@ -6592,7 +6677,7 @@
           <a:p>
             <a:fld id="{AACAA9B4-0EE4-FC4D-BE81-EA98845A0C10}" type="datetime1">
               <a:rPr lang="en-US" smtClean="0"/>
-              <a:t>2/13/18</a:t>
+              <a:t>12/11/19</a:t>
             </a:fld>
             <a:endParaRPr lang="en-US"/>
           </a:p>
@@ -6803,7 +6888,7 @@
           <a:p>
             <a:fld id="{C15F6ACF-BE73-1A41-A391-5F549B566778}" type="datetime1">
               <a:rPr lang="en-US" smtClean="0"/>
-              <a:t>2/13/18</a:t>
+              <a:t>12/11/19</a:t>
             </a:fld>
             <a:endParaRPr lang="en-US"/>
           </a:p>
@@ -7289,27 +7374,8 @@
                 <a:ea typeface="Consolas" charset="0"/>
                 <a:cs typeface="Consolas" charset="0"/>
               </a:rPr>
-              <a:t>Week </a:t>
-            </a:r>
-            <a:r>
-              <a:rPr lang="en-US" sz="3600" b="1" dirty="0" smtClean="0">
-                <a:solidFill>
-                  <a:schemeClr val="accent3"/>
-                </a:solidFill>
-                <a:latin typeface="Consolas" charset="0"/>
-                <a:ea typeface="Consolas" charset="0"/>
-                <a:cs typeface="Consolas" charset="0"/>
-              </a:rPr>
-              <a:t>5</a:t>
-            </a:r>
-            <a:endParaRPr lang="en-US" sz="3600" b="1" dirty="0">
-              <a:solidFill>
-                <a:schemeClr val="accent3"/>
-              </a:solidFill>
-              <a:latin typeface="Consolas" charset="0"/>
-              <a:ea typeface="Consolas" charset="0"/>
-              <a:cs typeface="Consolas" charset="0"/>
-            </a:endParaRPr>
+              <a:t>Week 5</a:t>
+            </a:r>
           </a:p>
         </p:txBody>
       </p:sp>
@@ -7461,7 +7527,7 @@
           <p:cNvPr id="4" name="Rectangle 3">
             <a:extLst>
               <a:ext uri="{FF2B5EF4-FFF2-40B4-BE49-F238E27FC236}">
-                <a16:creationId xmlns:a16="http://schemas.microsoft.com/office/drawing/2014/main" xmlns="" id="{1081156F-B192-4F4B-BCB9-09E835E6A1C1}"/>
+                <a16:creationId xmlns:a16="http://schemas.microsoft.com/office/drawing/2014/main" id="{1081156F-B192-4F4B-BCB9-09E835E6A1C1}"/>
               </a:ext>
             </a:extLst>
           </p:cNvPr>
@@ -7506,7 +7572,7 @@
           <p:cNvPr id="6" name="Rectangle 5">
             <a:extLst>
               <a:ext uri="{FF2B5EF4-FFF2-40B4-BE49-F238E27FC236}">
-                <a16:creationId xmlns:a16="http://schemas.microsoft.com/office/drawing/2014/main" xmlns="" id="{D5546DBD-7AD3-7842-B4F4-E45A849E60BB}"/>
+                <a16:creationId xmlns:a16="http://schemas.microsoft.com/office/drawing/2014/main" id="{D5546DBD-7AD3-7842-B4F4-E45A849E60BB}"/>
               </a:ext>
             </a:extLst>
           </p:cNvPr>
@@ -7552,7 +7618,7 @@
           <p:cNvPr id="8" name="Rectangle 7">
             <a:extLst>
               <a:ext uri="{FF2B5EF4-FFF2-40B4-BE49-F238E27FC236}">
-                <a16:creationId xmlns:a16="http://schemas.microsoft.com/office/drawing/2014/main" xmlns="" id="{5DED8DBF-5018-3743-AFB8-00DE5C7323E6}"/>
+                <a16:creationId xmlns:a16="http://schemas.microsoft.com/office/drawing/2014/main" id="{5DED8DBF-5018-3743-AFB8-00DE5C7323E6}"/>
               </a:ext>
             </a:extLst>
           </p:cNvPr>
@@ -7658,7 +7724,7 @@
           <p:cNvPr id="7" name="Rectangle 6">
             <a:extLst>
               <a:ext uri="{FF2B5EF4-FFF2-40B4-BE49-F238E27FC236}">
-                <a16:creationId xmlns:a16="http://schemas.microsoft.com/office/drawing/2014/main" xmlns="" id="{9D924A2D-88FA-4740-9B03-6AC58789A717}"/>
+                <a16:creationId xmlns:a16="http://schemas.microsoft.com/office/drawing/2014/main" id="{9D924A2D-88FA-4740-9B03-6AC58789A717}"/>
               </a:ext>
             </a:extLst>
           </p:cNvPr>
@@ -7742,7 +7808,7 @@
           <p:cNvPr id="9" name="Bent-Up Arrow 8">
             <a:extLst>
               <a:ext uri="{FF2B5EF4-FFF2-40B4-BE49-F238E27FC236}">
-                <a16:creationId xmlns:a16="http://schemas.microsoft.com/office/drawing/2014/main" xmlns="" id="{7EE85762-44DB-7F48-994F-FD34F24F484A}"/>
+                <a16:creationId xmlns:a16="http://schemas.microsoft.com/office/drawing/2014/main" id="{7EE85762-44DB-7F48-994F-FD34F24F484A}"/>
               </a:ext>
             </a:extLst>
           </p:cNvPr>
@@ -7883,7 +7949,7 @@
           <p:cNvPr id="4" name="Rectangle 3">
             <a:extLst>
               <a:ext uri="{FF2B5EF4-FFF2-40B4-BE49-F238E27FC236}">
-                <a16:creationId xmlns:a16="http://schemas.microsoft.com/office/drawing/2014/main" xmlns="" id="{1081156F-B192-4F4B-BCB9-09E835E6A1C1}"/>
+                <a16:creationId xmlns:a16="http://schemas.microsoft.com/office/drawing/2014/main" id="{1081156F-B192-4F4B-BCB9-09E835E6A1C1}"/>
               </a:ext>
             </a:extLst>
           </p:cNvPr>
@@ -7928,7 +7994,7 @@
           <p:cNvPr id="6" name="Rectangle 5">
             <a:extLst>
               <a:ext uri="{FF2B5EF4-FFF2-40B4-BE49-F238E27FC236}">
-                <a16:creationId xmlns:a16="http://schemas.microsoft.com/office/drawing/2014/main" xmlns="" id="{D5546DBD-7AD3-7842-B4F4-E45A849E60BB}"/>
+                <a16:creationId xmlns:a16="http://schemas.microsoft.com/office/drawing/2014/main" id="{D5546DBD-7AD3-7842-B4F4-E45A849E60BB}"/>
               </a:ext>
             </a:extLst>
           </p:cNvPr>
@@ -7974,7 +8040,7 @@
           <p:cNvPr id="8" name="Rectangle 7">
             <a:extLst>
               <a:ext uri="{FF2B5EF4-FFF2-40B4-BE49-F238E27FC236}">
-                <a16:creationId xmlns:a16="http://schemas.microsoft.com/office/drawing/2014/main" xmlns="" id="{5DED8DBF-5018-3743-AFB8-00DE5C7323E6}"/>
+                <a16:creationId xmlns:a16="http://schemas.microsoft.com/office/drawing/2014/main" id="{5DED8DBF-5018-3743-AFB8-00DE5C7323E6}"/>
               </a:ext>
             </a:extLst>
           </p:cNvPr>
@@ -8079,7 +8145,7 @@
           <p:cNvPr id="7" name="Rectangle 6">
             <a:extLst>
               <a:ext uri="{FF2B5EF4-FFF2-40B4-BE49-F238E27FC236}">
-                <a16:creationId xmlns:a16="http://schemas.microsoft.com/office/drawing/2014/main" xmlns="" id="{66B3FFB4-DEAD-FE4C-8A8C-D7AE343CDADB}"/>
+                <a16:creationId xmlns:a16="http://schemas.microsoft.com/office/drawing/2014/main" id="{66B3FFB4-DEAD-FE4C-8A8C-D7AE343CDADB}"/>
               </a:ext>
             </a:extLst>
           </p:cNvPr>
@@ -8132,7 +8198,7 @@
           <p:cNvPr id="9" name="Bent-Up Arrow 8">
             <a:extLst>
               <a:ext uri="{FF2B5EF4-FFF2-40B4-BE49-F238E27FC236}">
-                <a16:creationId xmlns:a16="http://schemas.microsoft.com/office/drawing/2014/main" xmlns="" id="{2C9E31F0-4B9F-2643-853B-DE67A7DC9527}"/>
+                <a16:creationId xmlns:a16="http://schemas.microsoft.com/office/drawing/2014/main" id="{2C9E31F0-4B9F-2643-853B-DE67A7DC9527}"/>
               </a:ext>
             </a:extLst>
           </p:cNvPr>
@@ -8277,7 +8343,7 @@
           <p:cNvPr id="4" name="Rectangle 3">
             <a:extLst>
               <a:ext uri="{FF2B5EF4-FFF2-40B4-BE49-F238E27FC236}">
-                <a16:creationId xmlns:a16="http://schemas.microsoft.com/office/drawing/2014/main" xmlns="" id="{1081156F-B192-4F4B-BCB9-09E835E6A1C1}"/>
+                <a16:creationId xmlns:a16="http://schemas.microsoft.com/office/drawing/2014/main" id="{1081156F-B192-4F4B-BCB9-09E835E6A1C1}"/>
               </a:ext>
             </a:extLst>
           </p:cNvPr>
@@ -8322,7 +8388,7 @@
           <p:cNvPr id="6" name="Rectangle 5">
             <a:extLst>
               <a:ext uri="{FF2B5EF4-FFF2-40B4-BE49-F238E27FC236}">
-                <a16:creationId xmlns:a16="http://schemas.microsoft.com/office/drawing/2014/main" xmlns="" id="{D5546DBD-7AD3-7842-B4F4-E45A849E60BB}"/>
+                <a16:creationId xmlns:a16="http://schemas.microsoft.com/office/drawing/2014/main" id="{D5546DBD-7AD3-7842-B4F4-E45A849E60BB}"/>
               </a:ext>
             </a:extLst>
           </p:cNvPr>
@@ -8368,7 +8434,7 @@
           <p:cNvPr id="8" name="Rectangle 7">
             <a:extLst>
               <a:ext uri="{FF2B5EF4-FFF2-40B4-BE49-F238E27FC236}">
-                <a16:creationId xmlns:a16="http://schemas.microsoft.com/office/drawing/2014/main" xmlns="" id="{5DED8DBF-5018-3743-AFB8-00DE5C7323E6}"/>
+                <a16:creationId xmlns:a16="http://schemas.microsoft.com/office/drawing/2014/main" id="{5DED8DBF-5018-3743-AFB8-00DE5C7323E6}"/>
               </a:ext>
             </a:extLst>
           </p:cNvPr>
@@ -8473,7 +8539,7 @@
           <p:cNvPr id="7" name="Rectangle 6">
             <a:extLst>
               <a:ext uri="{FF2B5EF4-FFF2-40B4-BE49-F238E27FC236}">
-                <a16:creationId xmlns:a16="http://schemas.microsoft.com/office/drawing/2014/main" xmlns="" id="{5DCBD66D-DABE-6443-A731-A9C1FDB1DB62}"/>
+                <a16:creationId xmlns:a16="http://schemas.microsoft.com/office/drawing/2014/main" id="{5DCBD66D-DABE-6443-A731-A9C1FDB1DB62}"/>
               </a:ext>
             </a:extLst>
           </p:cNvPr>
@@ -8531,7 +8597,7 @@
           <p:cNvPr id="9" name="Bent-Up Arrow 8">
             <a:extLst>
               <a:ext uri="{FF2B5EF4-FFF2-40B4-BE49-F238E27FC236}">
-                <a16:creationId xmlns:a16="http://schemas.microsoft.com/office/drawing/2014/main" xmlns="" id="{73BC553A-D5F3-9540-B68F-7E47A6A14E6F}"/>
+                <a16:creationId xmlns:a16="http://schemas.microsoft.com/office/drawing/2014/main" id="{73BC553A-D5F3-9540-B68F-7E47A6A14E6F}"/>
               </a:ext>
             </a:extLst>
           </p:cNvPr>
@@ -8672,7 +8738,7 @@
           <p:cNvPr id="4" name="Rectangle 3">
             <a:extLst>
               <a:ext uri="{FF2B5EF4-FFF2-40B4-BE49-F238E27FC236}">
-                <a16:creationId xmlns:a16="http://schemas.microsoft.com/office/drawing/2014/main" xmlns="" id="{1081156F-B192-4F4B-BCB9-09E835E6A1C1}"/>
+                <a16:creationId xmlns:a16="http://schemas.microsoft.com/office/drawing/2014/main" id="{1081156F-B192-4F4B-BCB9-09E835E6A1C1}"/>
               </a:ext>
             </a:extLst>
           </p:cNvPr>
@@ -8717,7 +8783,7 @@
           <p:cNvPr id="6" name="Rectangle 5">
             <a:extLst>
               <a:ext uri="{FF2B5EF4-FFF2-40B4-BE49-F238E27FC236}">
-                <a16:creationId xmlns:a16="http://schemas.microsoft.com/office/drawing/2014/main" xmlns="" id="{D5546DBD-7AD3-7842-B4F4-E45A849E60BB}"/>
+                <a16:creationId xmlns:a16="http://schemas.microsoft.com/office/drawing/2014/main" id="{D5546DBD-7AD3-7842-B4F4-E45A849E60BB}"/>
               </a:ext>
             </a:extLst>
           </p:cNvPr>
@@ -8763,7 +8829,7 @@
           <p:cNvPr id="9" name="Rectangle 8">
             <a:extLst>
               <a:ext uri="{FF2B5EF4-FFF2-40B4-BE49-F238E27FC236}">
-                <a16:creationId xmlns:a16="http://schemas.microsoft.com/office/drawing/2014/main" xmlns="" id="{8F6F0335-ADC9-BF44-84EC-18F8A781CF8A}"/>
+                <a16:creationId xmlns:a16="http://schemas.microsoft.com/office/drawing/2014/main" id="{8F6F0335-ADC9-BF44-84EC-18F8A781CF8A}"/>
               </a:ext>
             </a:extLst>
           </p:cNvPr>
@@ -9266,7 +9332,7 @@
           <p:cNvPr id="6" name="Rectangle 5">
             <a:extLst>
               <a:ext uri="{FF2B5EF4-FFF2-40B4-BE49-F238E27FC236}">
-                <a16:creationId xmlns:a16="http://schemas.microsoft.com/office/drawing/2014/main" xmlns="" id="{A159961C-5DDD-964F-B465-83D657696EA1}"/>
+                <a16:creationId xmlns:a16="http://schemas.microsoft.com/office/drawing/2014/main" id="{A159961C-5DDD-964F-B465-83D657696EA1}"/>
               </a:ext>
             </a:extLst>
           </p:cNvPr>
@@ -9313,7 +9379,7 @@
               <p:cNvPr id="4" name="Table 3">
                 <a:extLst>
                   <a:ext uri="{FF2B5EF4-FFF2-40B4-BE49-F238E27FC236}">
-                    <a16:creationId xmlns:a16="http://schemas.microsoft.com/office/drawing/2014/main" xmlns="" id="{B563A970-47AB-5240-8D7D-5CA9ADBBEFDA}"/>
+                    <a16:creationId xmlns:a16="http://schemas.microsoft.com/office/drawing/2014/main" id="{B563A970-47AB-5240-8D7D-5CA9ADBBEFDA}"/>
                   </a:ext>
                 </a:extLst>
               </p:cNvPr>
@@ -9342,28 +9408,28 @@
                     <a:gridCol w="1884130">
                       <a:extLst>
                         <a:ext uri="{9D8B030D-6E8A-4147-A177-3AD203B41FA5}">
-                          <a16:colId xmlns:a16="http://schemas.microsoft.com/office/drawing/2014/main" xmlns="" val="1603415222"/>
+                          <a16:colId xmlns:a16="http://schemas.microsoft.com/office/drawing/2014/main" val="1603415222"/>
                         </a:ext>
                       </a:extLst>
                     </a:gridCol>
                     <a:gridCol w="3022264">
                       <a:extLst>
                         <a:ext uri="{9D8B030D-6E8A-4147-A177-3AD203B41FA5}">
-                          <a16:colId xmlns:a16="http://schemas.microsoft.com/office/drawing/2014/main" xmlns="" val="2896810510"/>
+                          <a16:colId xmlns:a16="http://schemas.microsoft.com/office/drawing/2014/main" val="2896810510"/>
                         </a:ext>
                       </a:extLst>
                     </a:gridCol>
                     <a:gridCol w="2983351">
                       <a:extLst>
                         <a:ext uri="{9D8B030D-6E8A-4147-A177-3AD203B41FA5}">
-                          <a16:colId xmlns:a16="http://schemas.microsoft.com/office/drawing/2014/main" xmlns="" val="1060877502"/>
+                          <a16:colId xmlns:a16="http://schemas.microsoft.com/office/drawing/2014/main" val="1060877502"/>
                         </a:ext>
                       </a:extLst>
                     </a:gridCol>
                     <a:gridCol w="3048207">
                       <a:extLst>
                         <a:ext uri="{9D8B030D-6E8A-4147-A177-3AD203B41FA5}">
-                          <a16:colId xmlns:a16="http://schemas.microsoft.com/office/drawing/2014/main" xmlns="" val="1462196635"/>
+                          <a16:colId xmlns:a16="http://schemas.microsoft.com/office/drawing/2014/main" val="1462196635"/>
                         </a:ext>
                       </a:extLst>
                     </a:gridCol>
@@ -9423,7 +9489,7 @@
                     </a:tc>
                     <a:extLst>
                       <a:ext uri="{0D108BD9-81ED-4DB2-BD59-A6C34878D82A}">
-                        <a16:rowId xmlns:a16="http://schemas.microsoft.com/office/drawing/2014/main" xmlns="" val="2538790727"/>
+                        <a16:rowId xmlns:a16="http://schemas.microsoft.com/office/drawing/2014/main" val="2538790727"/>
                       </a:ext>
                     </a:extLst>
                   </a:tr>
@@ -9457,7 +9523,7 @@
                                   <m:sSubPr>
                                     <m:ctrlPr>
                                       <a:rPr lang="en-US" sz="2400" b="0" i="1" smtClean="0">
-                                        <a:latin typeface="Cambria Math" charset="0"/>
+                                        <a:latin typeface="Cambria Math" panose="02040503050406030204" pitchFamily="18" charset="0"/>
                                       </a:rPr>
                                     </m:ctrlPr>
                                   </m:sSubPr>
@@ -9488,7 +9554,7 @@
                                   <m:sSubPr>
                                     <m:ctrlPr>
                                       <a:rPr lang="en-US" sz="2400" b="0" i="1" smtClean="0">
-                                        <a:latin typeface="Cambria Math" charset="0"/>
+                                        <a:latin typeface="Cambria Math" panose="02040503050406030204" pitchFamily="18" charset="0"/>
                                       </a:rPr>
                                     </m:ctrlPr>
                                   </m:sSubPr>
@@ -9545,7 +9611,7 @@
                     </a:tc>
                     <a:extLst>
                       <a:ext uri="{0D108BD9-81ED-4DB2-BD59-A6C34878D82A}">
-                        <a16:rowId xmlns:a16="http://schemas.microsoft.com/office/drawing/2014/main" xmlns="" val="2589195531"/>
+                        <a16:rowId xmlns:a16="http://schemas.microsoft.com/office/drawing/2014/main" val="2589195531"/>
                       </a:ext>
                     </a:extLst>
                   </a:tr>
@@ -9595,7 +9661,7 @@
                                   <m:sSubPr>
                                     <m:ctrlPr>
                                       <a:rPr lang="en-US" sz="2400" b="0" i="1" smtClean="0">
-                                        <a:latin typeface="Cambria Math" charset="0"/>
+                                        <a:latin typeface="Cambria Math" panose="02040503050406030204" pitchFamily="18" charset="0"/>
                                       </a:rPr>
                                     </m:ctrlPr>
                                   </m:sSubPr>
@@ -9626,7 +9692,7 @@
                                   <m:sSubPr>
                                     <m:ctrlPr>
                                       <a:rPr lang="en-US" sz="2400" b="0" i="1" smtClean="0">
-                                        <a:latin typeface="Cambria Math" charset="0"/>
+                                        <a:latin typeface="Cambria Math" panose="02040503050406030204" pitchFamily="18" charset="0"/>
                                       </a:rPr>
                                     </m:ctrlPr>
                                   </m:sSubPr>
@@ -9694,7 +9760,7 @@
                     </a:tc>
                     <a:extLst>
                       <a:ext uri="{0D108BD9-81ED-4DB2-BD59-A6C34878D82A}">
-                        <a16:rowId xmlns:a16="http://schemas.microsoft.com/office/drawing/2014/main" xmlns="" val="3426463444"/>
+                        <a16:rowId xmlns:a16="http://schemas.microsoft.com/office/drawing/2014/main" val="3426463444"/>
                       </a:ext>
                     </a:extLst>
                   </a:tr>
@@ -10057,7 +10123,7 @@
           <p:cNvPr id="10" name="TextBox 9">
             <a:extLst>
               <a:ext uri="{FF2B5EF4-FFF2-40B4-BE49-F238E27FC236}">
-                <a16:creationId xmlns:a16="http://schemas.microsoft.com/office/drawing/2014/main" xmlns="" id="{62E219FA-28DD-894F-B184-C72CAF779949}"/>
+                <a16:creationId xmlns:a16="http://schemas.microsoft.com/office/drawing/2014/main" id="{62E219FA-28DD-894F-B184-C72CAF779949}"/>
               </a:ext>
             </a:extLst>
           </p:cNvPr>
@@ -10099,7 +10165,7 @@
           <p:cNvPr id="6" name="Rectangle 5">
             <a:extLst>
               <a:ext uri="{FF2B5EF4-FFF2-40B4-BE49-F238E27FC236}">
-                <a16:creationId xmlns:a16="http://schemas.microsoft.com/office/drawing/2014/main" xmlns="" id="{493688BE-EDBB-194C-A65F-1FF9EB5458BC}"/>
+                <a16:creationId xmlns:a16="http://schemas.microsoft.com/office/drawing/2014/main" id="{493688BE-EDBB-194C-A65F-1FF9EB5458BC}"/>
               </a:ext>
             </a:extLst>
           </p:cNvPr>
@@ -10144,7 +10210,7 @@
           <p:cNvPr id="7" name="TextBox 6">
             <a:extLst>
               <a:ext uri="{FF2B5EF4-FFF2-40B4-BE49-F238E27FC236}">
-                <a16:creationId xmlns:a16="http://schemas.microsoft.com/office/drawing/2014/main" xmlns="" id="{FF438587-A1B4-254C-9577-8F13D20ACF57}"/>
+                <a16:creationId xmlns:a16="http://schemas.microsoft.com/office/drawing/2014/main" id="{FF438587-A1B4-254C-9577-8F13D20ACF57}"/>
               </a:ext>
             </a:extLst>
           </p:cNvPr>
@@ -10186,7 +10252,7 @@
           <p:cNvPr id="4" name="Picture 3">
             <a:extLst>
               <a:ext uri="{FF2B5EF4-FFF2-40B4-BE49-F238E27FC236}">
-                <a16:creationId xmlns:a16="http://schemas.microsoft.com/office/drawing/2014/main" xmlns="" id="{202641BF-5204-D943-ADA1-8B35103617C5}"/>
+                <a16:creationId xmlns:a16="http://schemas.microsoft.com/office/drawing/2014/main" id="{202641BF-5204-D943-ADA1-8B35103617C5}"/>
               </a:ext>
             </a:extLst>
           </p:cNvPr>
@@ -10216,7 +10282,7 @@
           <p:cNvPr id="16" name="Group 15">
             <a:extLst>
               <a:ext uri="{FF2B5EF4-FFF2-40B4-BE49-F238E27FC236}">
-                <a16:creationId xmlns:a16="http://schemas.microsoft.com/office/drawing/2014/main" xmlns="" id="{DFF30F44-F0BF-B44E-8D92-0576089E12D6}"/>
+                <a16:creationId xmlns:a16="http://schemas.microsoft.com/office/drawing/2014/main" id="{DFF30F44-F0BF-B44E-8D92-0576089E12D6}"/>
               </a:ext>
             </a:extLst>
           </p:cNvPr>
@@ -10236,7 +10302,7 @@
             <p:cNvPr id="9" name="Straight Connector 8">
               <a:extLst>
                 <a:ext uri="{FF2B5EF4-FFF2-40B4-BE49-F238E27FC236}">
-                  <a16:creationId xmlns:a16="http://schemas.microsoft.com/office/drawing/2014/main" xmlns="" id="{1EACB965-EDD4-144F-B457-4B76AFFA7CD9}"/>
+                  <a16:creationId xmlns:a16="http://schemas.microsoft.com/office/drawing/2014/main" id="{1EACB965-EDD4-144F-B457-4B76AFFA7CD9}"/>
                 </a:ext>
               </a:extLst>
             </p:cNvPr>
@@ -10277,7 +10343,7 @@
             <p:cNvPr id="11" name="Straight Connector 10">
               <a:extLst>
                 <a:ext uri="{FF2B5EF4-FFF2-40B4-BE49-F238E27FC236}">
-                  <a16:creationId xmlns:a16="http://schemas.microsoft.com/office/drawing/2014/main" xmlns="" id="{F3606A8A-B9B0-DC46-AD0F-C461285DCCE6}"/>
+                  <a16:creationId xmlns:a16="http://schemas.microsoft.com/office/drawing/2014/main" id="{F3606A8A-B9B0-DC46-AD0F-C461285DCCE6}"/>
                 </a:ext>
               </a:extLst>
             </p:cNvPr>
@@ -10318,7 +10384,7 @@
             <p:cNvPr id="13" name="Straight Arrow Connector 12">
               <a:extLst>
                 <a:ext uri="{FF2B5EF4-FFF2-40B4-BE49-F238E27FC236}">
-                  <a16:creationId xmlns:a16="http://schemas.microsoft.com/office/drawing/2014/main" xmlns="" id="{9A029505-ECD9-D747-83AD-B60B39342FAF}"/>
+                  <a16:creationId xmlns:a16="http://schemas.microsoft.com/office/drawing/2014/main" id="{9A029505-ECD9-D747-83AD-B60B39342FAF}"/>
                 </a:ext>
               </a:extLst>
             </p:cNvPr>
@@ -10360,7 +10426,7 @@
             <p:cNvPr id="14" name="Straight Arrow Connector 13">
               <a:extLst>
                 <a:ext uri="{FF2B5EF4-FFF2-40B4-BE49-F238E27FC236}">
-                  <a16:creationId xmlns:a16="http://schemas.microsoft.com/office/drawing/2014/main" xmlns="" id="{7C1E1FE6-AB1B-AC4D-8135-732760347ED8}"/>
+                  <a16:creationId xmlns:a16="http://schemas.microsoft.com/office/drawing/2014/main" id="{7C1E1FE6-AB1B-AC4D-8135-732760347ED8}"/>
                 </a:ext>
               </a:extLst>
             </p:cNvPr>
@@ -10641,7 +10707,7 @@
           <p:cNvPr id="10" name="TextBox 9">
             <a:extLst>
               <a:ext uri="{FF2B5EF4-FFF2-40B4-BE49-F238E27FC236}">
-                <a16:creationId xmlns:a16="http://schemas.microsoft.com/office/drawing/2014/main" xmlns="" id="{62E219FA-28DD-894F-B184-C72CAF779949}"/>
+                <a16:creationId xmlns:a16="http://schemas.microsoft.com/office/drawing/2014/main" id="{62E219FA-28DD-894F-B184-C72CAF779949}"/>
               </a:ext>
             </a:extLst>
           </p:cNvPr>
@@ -10683,7 +10749,7 @@
           <p:cNvPr id="6" name="Rectangle 5">
             <a:extLst>
               <a:ext uri="{FF2B5EF4-FFF2-40B4-BE49-F238E27FC236}">
-                <a16:creationId xmlns:a16="http://schemas.microsoft.com/office/drawing/2014/main" xmlns="" id="{493688BE-EDBB-194C-A65F-1FF9EB5458BC}"/>
+                <a16:creationId xmlns:a16="http://schemas.microsoft.com/office/drawing/2014/main" id="{493688BE-EDBB-194C-A65F-1FF9EB5458BC}"/>
               </a:ext>
             </a:extLst>
           </p:cNvPr>
@@ -10728,7 +10794,7 @@
           <p:cNvPr id="7" name="TextBox 6">
             <a:extLst>
               <a:ext uri="{FF2B5EF4-FFF2-40B4-BE49-F238E27FC236}">
-                <a16:creationId xmlns:a16="http://schemas.microsoft.com/office/drawing/2014/main" xmlns="" id="{FF438587-A1B4-254C-9577-8F13D20ACF57}"/>
+                <a16:creationId xmlns:a16="http://schemas.microsoft.com/office/drawing/2014/main" id="{FF438587-A1B4-254C-9577-8F13D20ACF57}"/>
               </a:ext>
             </a:extLst>
           </p:cNvPr>
@@ -10783,7 +10849,7 @@
           <p:cNvPr id="3" name="Rectangle 2">
             <a:extLst>
               <a:ext uri="{FF2B5EF4-FFF2-40B4-BE49-F238E27FC236}">
-                <a16:creationId xmlns:a16="http://schemas.microsoft.com/office/drawing/2014/main" xmlns="" id="{5B22A8B7-52ED-AE4F-B7DC-BAF11CD6864F}"/>
+                <a16:creationId xmlns:a16="http://schemas.microsoft.com/office/drawing/2014/main" id="{5B22A8B7-52ED-AE4F-B7DC-BAF11CD6864F}"/>
               </a:ext>
             </a:extLst>
           </p:cNvPr>
@@ -10825,7 +10891,7 @@
           <p:cNvPr id="8" name="Bent-Up Arrow 7">
             <a:extLst>
               <a:ext uri="{FF2B5EF4-FFF2-40B4-BE49-F238E27FC236}">
-                <a16:creationId xmlns:a16="http://schemas.microsoft.com/office/drawing/2014/main" xmlns="" id="{D257471F-D048-1E4A-BF69-57B6A7011981}"/>
+                <a16:creationId xmlns:a16="http://schemas.microsoft.com/office/drawing/2014/main" id="{D257471F-D048-1E4A-BF69-57B6A7011981}"/>
               </a:ext>
             </a:extLst>
           </p:cNvPr>
@@ -10881,7 +10947,7 @@
               <p:cNvPr id="15" name="TextBox 14">
                 <a:extLst>
                   <a:ext uri="{FF2B5EF4-FFF2-40B4-BE49-F238E27FC236}">
-                    <a16:creationId xmlns:a16="http://schemas.microsoft.com/office/drawing/2014/main" xmlns="" id="{A859C593-0A2A-F446-8958-62BF8AE58024}"/>
+                    <a16:creationId xmlns:a16="http://schemas.microsoft.com/office/drawing/2014/main" id="{A859C593-0A2A-F446-8958-62BF8AE58024}"/>
                   </a:ext>
                 </a:extLst>
               </p:cNvPr>
@@ -10918,7 +10984,7 @@
                               <a:solidFill>
                                 <a:schemeClr val="tx2"/>
                               </a:solidFill>
-                              <a:latin typeface="Cambria Math" charset="0"/>
+                              <a:latin typeface="Cambria Math" panose="02040503050406030204" pitchFamily="18" charset="0"/>
                               <a:ea typeface="Consolas" charset="0"/>
                               <a:cs typeface="Consolas" charset="0"/>
                             </a:rPr>
@@ -11062,7 +11128,7 @@
               <p:cNvPr id="17" name="TextBox 16">
                 <a:extLst>
                   <a:ext uri="{FF2B5EF4-FFF2-40B4-BE49-F238E27FC236}">
-                    <a16:creationId xmlns:a16="http://schemas.microsoft.com/office/drawing/2014/main" xmlns="" id="{19992B36-EAD2-D649-B2E9-3701DA3B545B}"/>
+                    <a16:creationId xmlns:a16="http://schemas.microsoft.com/office/drawing/2014/main" id="{19992B36-EAD2-D649-B2E9-3701DA3B545B}"/>
                   </a:ext>
                 </a:extLst>
               </p:cNvPr>
@@ -11171,7 +11237,7 @@
                               <a:solidFill>
                                 <a:schemeClr val="accent6"/>
                               </a:solidFill>
-                              <a:latin typeface="Cambria Math" charset="0"/>
+                              <a:latin typeface="Cambria Math" panose="02040503050406030204" pitchFamily="18" charset="0"/>
                               <a:ea typeface="Consolas" charset="0"/>
                               <a:cs typeface="Consolas" charset="0"/>
                             </a:rPr>
@@ -11675,7 +11741,7 @@
               <p:cNvPr id="10" name="TextBox 9">
                 <a:extLst>
                   <a:ext uri="{FF2B5EF4-FFF2-40B4-BE49-F238E27FC236}">
-                    <a16:creationId xmlns:a16="http://schemas.microsoft.com/office/drawing/2014/main" xmlns="" id="{62E219FA-28DD-894F-B184-C72CAF779949}"/>
+                    <a16:creationId xmlns:a16="http://schemas.microsoft.com/office/drawing/2014/main" id="{62E219FA-28DD-894F-B184-C72CAF779949}"/>
                   </a:ext>
                 </a:extLst>
               </p:cNvPr>
@@ -11790,7 +11856,7 @@
           <p:cNvPr id="6" name="Rectangle 5">
             <a:extLst>
               <a:ext uri="{FF2B5EF4-FFF2-40B4-BE49-F238E27FC236}">
-                <a16:creationId xmlns:a16="http://schemas.microsoft.com/office/drawing/2014/main" xmlns="" id="{0474D595-141C-6849-A646-28B542DAD5D5}"/>
+                <a16:creationId xmlns:a16="http://schemas.microsoft.com/office/drawing/2014/main" id="{0474D595-141C-6849-A646-28B542DAD5D5}"/>
               </a:ext>
             </a:extLst>
           </p:cNvPr>
@@ -11837,7 +11903,7 @@
               <p:cNvPr id="7" name="TextBox 6">
                 <a:extLst>
                   <a:ext uri="{FF2B5EF4-FFF2-40B4-BE49-F238E27FC236}">
-                    <a16:creationId xmlns:a16="http://schemas.microsoft.com/office/drawing/2014/main" xmlns="" id="{B9A27781-6779-CA48-96CD-3E7F6E6F6CAC}"/>
+                    <a16:creationId xmlns:a16="http://schemas.microsoft.com/office/drawing/2014/main" id="{B9A27781-6779-CA48-96CD-3E7F6E6F6CAC}"/>
                   </a:ext>
                 </a:extLst>
               </p:cNvPr>
@@ -11883,7 +11949,7 @@
                         <m:fPr>
                           <m:ctrlPr>
                             <a:rPr lang="en-US" sz="4000" b="0" i="1" smtClean="0">
-                              <a:latin typeface="Cambria Math" charset="0"/>
+                              <a:latin typeface="Cambria Math" panose="02040503050406030204" pitchFamily="18" charset="0"/>
                             </a:rPr>
                           </m:ctrlPr>
                         </m:fPr>
@@ -11914,7 +11980,7 @@
                               <m:type m:val="skw"/>
                               <m:ctrlPr>
                                 <a:rPr lang="en-US" sz="4000" b="0" i="1" smtClean="0">
-                                  <a:latin typeface="Cambria Math" charset="0"/>
+                                  <a:latin typeface="Cambria Math" panose="02040503050406030204" pitchFamily="18" charset="0"/>
                                   <a:ea typeface="Cambria Math" panose="02040503050406030204" pitchFamily="18" charset="0"/>
                                 </a:rPr>
                               </m:ctrlPr>
@@ -12010,7 +12076,7 @@
               <p:cNvPr id="8" name="TextBox 7">
                 <a:extLst>
                   <a:ext uri="{FF2B5EF4-FFF2-40B4-BE49-F238E27FC236}">
-                    <a16:creationId xmlns:a16="http://schemas.microsoft.com/office/drawing/2014/main" xmlns="" id="{C8402F19-A5A0-3542-B759-AE038D4FA4E7}"/>
+                    <a16:creationId xmlns:a16="http://schemas.microsoft.com/office/drawing/2014/main" id="{C8402F19-A5A0-3542-B759-AE038D4FA4E7}"/>
                   </a:ext>
                 </a:extLst>
               </p:cNvPr>
@@ -12054,7 +12120,7 @@
                             <a:solidFill>
                               <a:schemeClr val="tx2"/>
                             </a:solidFill>
-                            <a:latin typeface="Cambria Math" charset="0"/>
+                            <a:latin typeface="Cambria Math" panose="02040503050406030204" pitchFamily="18" charset="0"/>
                           </a:rPr>
                         </m:ctrlPr>
                       </m:sSubPr>
@@ -12374,7 +12440,7 @@
           <p:cNvPr id="10" name="TextBox 9">
             <a:extLst>
               <a:ext uri="{FF2B5EF4-FFF2-40B4-BE49-F238E27FC236}">
-                <a16:creationId xmlns:a16="http://schemas.microsoft.com/office/drawing/2014/main" xmlns="" id="{62E219FA-28DD-894F-B184-C72CAF779949}"/>
+                <a16:creationId xmlns:a16="http://schemas.microsoft.com/office/drawing/2014/main" id="{62E219FA-28DD-894F-B184-C72CAF779949}"/>
               </a:ext>
             </a:extLst>
           </p:cNvPr>
@@ -12435,7 +12501,7 @@
           <p:cNvPr id="6" name="Rectangle 5">
             <a:extLst>
               <a:ext uri="{FF2B5EF4-FFF2-40B4-BE49-F238E27FC236}">
-                <a16:creationId xmlns:a16="http://schemas.microsoft.com/office/drawing/2014/main" xmlns="" id="{40CA9FB1-CC4C-2949-843D-D8D012B694A5}"/>
+                <a16:creationId xmlns:a16="http://schemas.microsoft.com/office/drawing/2014/main" id="{40CA9FB1-CC4C-2949-843D-D8D012B694A5}"/>
               </a:ext>
             </a:extLst>
           </p:cNvPr>
@@ -12482,7 +12548,7 @@
               <p:cNvPr id="4" name="TextBox 3">
                 <a:extLst>
                   <a:ext uri="{FF2B5EF4-FFF2-40B4-BE49-F238E27FC236}">
-                    <a16:creationId xmlns:a16="http://schemas.microsoft.com/office/drawing/2014/main" xmlns="" id="{D87BE456-96CB-BC4C-B6B3-4AD36BD17D9E}"/>
+                    <a16:creationId xmlns:a16="http://schemas.microsoft.com/office/drawing/2014/main" id="{D87BE456-96CB-BC4C-B6B3-4AD36BD17D9E}"/>
                   </a:ext>
                 </a:extLst>
               </p:cNvPr>
@@ -12537,7 +12603,7 @@
                               <a:solidFill>
                                 <a:schemeClr val="accent6"/>
                               </a:solidFill>
-                              <a:latin typeface="Cambria Math" charset="0"/>
+                              <a:latin typeface="Cambria Math" panose="02040503050406030204" pitchFamily="18" charset="0"/>
                             </a:rPr>
                           </m:ctrlPr>
                         </m:fPr>
@@ -12644,7 +12710,7 @@
           <p:cNvPr id="7" name="Table 6">
             <a:extLst>
               <a:ext uri="{FF2B5EF4-FFF2-40B4-BE49-F238E27FC236}">
-                <a16:creationId xmlns:a16="http://schemas.microsoft.com/office/drawing/2014/main" xmlns="" id="{0E60F6F4-904B-5E4C-BA9A-6719B53D6AF3}"/>
+                <a16:creationId xmlns:a16="http://schemas.microsoft.com/office/drawing/2014/main" id="{0E60F6F4-904B-5E4C-BA9A-6719B53D6AF3}"/>
               </a:ext>
             </a:extLst>
           </p:cNvPr>
@@ -12673,14 +12739,14 @@
                 <a:gridCol w="2286000">
                   <a:extLst>
                     <a:ext uri="{9D8B030D-6E8A-4147-A177-3AD203B41FA5}">
-                      <a16:colId xmlns:a16="http://schemas.microsoft.com/office/drawing/2014/main" xmlns="" val="2004006104"/>
+                      <a16:colId xmlns:a16="http://schemas.microsoft.com/office/drawing/2014/main" val="2004006104"/>
                     </a:ext>
                   </a:extLst>
                 </a:gridCol>
                 <a:gridCol w="5359400">
                   <a:extLst>
                     <a:ext uri="{9D8B030D-6E8A-4147-A177-3AD203B41FA5}">
-                      <a16:colId xmlns:a16="http://schemas.microsoft.com/office/drawing/2014/main" xmlns="" val="2605256838"/>
+                      <a16:colId xmlns:a16="http://schemas.microsoft.com/office/drawing/2014/main" val="2605256838"/>
                     </a:ext>
                   </a:extLst>
                 </a:gridCol>
@@ -12716,7 +12782,7 @@
                 </a:tc>
                 <a:extLst>
                   <a:ext uri="{0D108BD9-81ED-4DB2-BD59-A6C34878D82A}">
-                    <a16:rowId xmlns:a16="http://schemas.microsoft.com/office/drawing/2014/main" xmlns="" val="4057194693"/>
+                    <a16:rowId xmlns:a16="http://schemas.microsoft.com/office/drawing/2014/main" val="4057194693"/>
                   </a:ext>
                 </a:extLst>
               </a:tr>
@@ -12751,7 +12817,7 @@
                 </a:tc>
                 <a:extLst>
                   <a:ext uri="{0D108BD9-81ED-4DB2-BD59-A6C34878D82A}">
-                    <a16:rowId xmlns:a16="http://schemas.microsoft.com/office/drawing/2014/main" xmlns="" val="2017861069"/>
+                    <a16:rowId xmlns:a16="http://schemas.microsoft.com/office/drawing/2014/main" val="2017861069"/>
                   </a:ext>
                 </a:extLst>
               </a:tr>
@@ -12786,7 +12852,7 @@
                 </a:tc>
                 <a:extLst>
                   <a:ext uri="{0D108BD9-81ED-4DB2-BD59-A6C34878D82A}">
-                    <a16:rowId xmlns:a16="http://schemas.microsoft.com/office/drawing/2014/main" xmlns="" val="1515990545"/>
+                    <a16:rowId xmlns:a16="http://schemas.microsoft.com/office/drawing/2014/main" val="1515990545"/>
                   </a:ext>
                 </a:extLst>
               </a:tr>
@@ -12821,7 +12887,7 @@
                 </a:tc>
                 <a:extLst>
                   <a:ext uri="{0D108BD9-81ED-4DB2-BD59-A6C34878D82A}">
-                    <a16:rowId xmlns:a16="http://schemas.microsoft.com/office/drawing/2014/main" xmlns="" val="2158851004"/>
+                    <a16:rowId xmlns:a16="http://schemas.microsoft.com/office/drawing/2014/main" val="2158851004"/>
                   </a:ext>
                 </a:extLst>
               </a:tr>
@@ -13006,7 +13072,7 @@
           <p:cNvPr id="10" name="TextBox 9">
             <a:extLst>
               <a:ext uri="{FF2B5EF4-FFF2-40B4-BE49-F238E27FC236}">
-                <a16:creationId xmlns:a16="http://schemas.microsoft.com/office/drawing/2014/main" xmlns="" id="{62E219FA-28DD-894F-B184-C72CAF779949}"/>
+                <a16:creationId xmlns:a16="http://schemas.microsoft.com/office/drawing/2014/main" id="{62E219FA-28DD-894F-B184-C72CAF779949}"/>
               </a:ext>
             </a:extLst>
           </p:cNvPr>
@@ -13048,7 +13114,7 @@
           <p:cNvPr id="6" name="Rectangle 5">
             <a:extLst>
               <a:ext uri="{FF2B5EF4-FFF2-40B4-BE49-F238E27FC236}">
-                <a16:creationId xmlns:a16="http://schemas.microsoft.com/office/drawing/2014/main" xmlns="" id="{BC1B028F-F67A-D147-BB84-EBBFC34336ED}"/>
+                <a16:creationId xmlns:a16="http://schemas.microsoft.com/office/drawing/2014/main" id="{BC1B028F-F67A-D147-BB84-EBBFC34336ED}"/>
               </a:ext>
             </a:extLst>
           </p:cNvPr>
@@ -13093,7 +13159,7 @@
           <p:cNvPr id="7" name="TextBox 6">
             <a:extLst>
               <a:ext uri="{FF2B5EF4-FFF2-40B4-BE49-F238E27FC236}">
-                <a16:creationId xmlns:a16="http://schemas.microsoft.com/office/drawing/2014/main" xmlns="" id="{1DB1F116-D28F-334E-893D-8C3EF434488B}"/>
+                <a16:creationId xmlns:a16="http://schemas.microsoft.com/office/drawing/2014/main" id="{1DB1F116-D28F-334E-893D-8C3EF434488B}"/>
               </a:ext>
             </a:extLst>
           </p:cNvPr>
@@ -13341,7 +13407,7 @@
           <p:cNvPr id="6" name="Rectangle 5">
             <a:extLst>
               <a:ext uri="{FF2B5EF4-FFF2-40B4-BE49-F238E27FC236}">
-                <a16:creationId xmlns:a16="http://schemas.microsoft.com/office/drawing/2014/main" xmlns="" id="{6C823BF1-B6D7-CF47-A0A4-F6DA0DABA294}"/>
+                <a16:creationId xmlns:a16="http://schemas.microsoft.com/office/drawing/2014/main" id="{6C823BF1-B6D7-CF47-A0A4-F6DA0DABA294}"/>
               </a:ext>
             </a:extLst>
           </p:cNvPr>
@@ -13612,7 +13678,7 @@
               <p:cNvPr id="10" name="TextBox 9">
                 <a:extLst>
                   <a:ext uri="{FF2B5EF4-FFF2-40B4-BE49-F238E27FC236}">
-                    <a16:creationId xmlns:a16="http://schemas.microsoft.com/office/drawing/2014/main" xmlns="" id="{62E219FA-28DD-894F-B184-C72CAF779949}"/>
+                    <a16:creationId xmlns:a16="http://schemas.microsoft.com/office/drawing/2014/main" id="{62E219FA-28DD-894F-B184-C72CAF779949}"/>
                   </a:ext>
                 </a:extLst>
               </p:cNvPr>
@@ -13687,7 +13753,7 @@
                             <a:solidFill>
                               <a:schemeClr val="tx2"/>
                             </a:solidFill>
-                            <a:latin typeface="Cambria Math" charset="0"/>
+                            <a:latin typeface="Cambria Math" panose="02040503050406030204" pitchFamily="18" charset="0"/>
                             <a:ea typeface="Consolas" charset="0"/>
                             <a:cs typeface="Consolas" charset="0"/>
                           </a:rPr>
@@ -14052,7 +14118,7 @@
           <p:cNvPr id="4" name="Rectangle 3">
             <a:extLst>
               <a:ext uri="{FF2B5EF4-FFF2-40B4-BE49-F238E27FC236}">
-                <a16:creationId xmlns:a16="http://schemas.microsoft.com/office/drawing/2014/main" xmlns="" id="{5190B6BE-E3DE-924F-85E2-4454C0BEA015}"/>
+                <a16:creationId xmlns:a16="http://schemas.microsoft.com/office/drawing/2014/main" id="{5190B6BE-E3DE-924F-85E2-4454C0BEA015}"/>
               </a:ext>
             </a:extLst>
           </p:cNvPr>
@@ -14178,7 +14244,7 @@
           <p:cNvPr id="6" name="Picture 6" descr="Image result for type 2 error">
             <a:extLst>
               <a:ext uri="{FF2B5EF4-FFF2-40B4-BE49-F238E27FC236}">
-                <a16:creationId xmlns:a16="http://schemas.microsoft.com/office/drawing/2014/main" xmlns="" id="{C60077EF-9651-0249-B072-54893DF44306}"/>
+                <a16:creationId xmlns:a16="http://schemas.microsoft.com/office/drawing/2014/main" id="{C60077EF-9651-0249-B072-54893DF44306}"/>
               </a:ext>
             </a:extLst>
           </p:cNvPr>
@@ -14304,7 +14370,7 @@
           <p:cNvPr id="10" name="TextBox 9">
             <a:extLst>
               <a:ext uri="{FF2B5EF4-FFF2-40B4-BE49-F238E27FC236}">
-                <a16:creationId xmlns:a16="http://schemas.microsoft.com/office/drawing/2014/main" xmlns="" id="{62E219FA-28DD-894F-B184-C72CAF779949}"/>
+                <a16:creationId xmlns:a16="http://schemas.microsoft.com/office/drawing/2014/main" id="{62E219FA-28DD-894F-B184-C72CAF779949}"/>
               </a:ext>
             </a:extLst>
           </p:cNvPr>
@@ -14380,7 +14446,7 @@
           <p:cNvPr id="4" name="Rectangle 3">
             <a:extLst>
               <a:ext uri="{FF2B5EF4-FFF2-40B4-BE49-F238E27FC236}">
-                <a16:creationId xmlns:a16="http://schemas.microsoft.com/office/drawing/2014/main" xmlns="" id="{5190B6BE-E3DE-924F-85E2-4454C0BEA015}"/>
+                <a16:creationId xmlns:a16="http://schemas.microsoft.com/office/drawing/2014/main" id="{5190B6BE-E3DE-924F-85E2-4454C0BEA015}"/>
               </a:ext>
             </a:extLst>
           </p:cNvPr>
@@ -14506,7 +14572,7 @@
           <p:cNvPr id="4" name="Rectangle 3">
             <a:extLst>
               <a:ext uri="{FF2B5EF4-FFF2-40B4-BE49-F238E27FC236}">
-                <a16:creationId xmlns:a16="http://schemas.microsoft.com/office/drawing/2014/main" xmlns="" id="{5190B6BE-E3DE-924F-85E2-4454C0BEA015}"/>
+                <a16:creationId xmlns:a16="http://schemas.microsoft.com/office/drawing/2014/main" id="{5190B6BE-E3DE-924F-85E2-4454C0BEA015}"/>
               </a:ext>
             </a:extLst>
           </p:cNvPr>
@@ -14553,7 +14619,7 @@
           <p:cNvPr id="6" name="Rectangle 5">
             <a:extLst>
               <a:ext uri="{FF2B5EF4-FFF2-40B4-BE49-F238E27FC236}">
-                <a16:creationId xmlns:a16="http://schemas.microsoft.com/office/drawing/2014/main" xmlns="" id="{CB172EC8-90A6-9E44-81DB-A2C6927AA8C3}"/>
+                <a16:creationId xmlns:a16="http://schemas.microsoft.com/office/drawing/2014/main" id="{CB172EC8-90A6-9E44-81DB-A2C6927AA8C3}"/>
               </a:ext>
             </a:extLst>
           </p:cNvPr>
@@ -14599,7 +14665,7 @@
           <p:cNvPr id="7" name="Rectangle 6">
             <a:extLst>
               <a:ext uri="{FF2B5EF4-FFF2-40B4-BE49-F238E27FC236}">
-                <a16:creationId xmlns:a16="http://schemas.microsoft.com/office/drawing/2014/main" xmlns="" id="{B6441292-CC6A-454A-9155-CF39B799176B}"/>
+                <a16:creationId xmlns:a16="http://schemas.microsoft.com/office/drawing/2014/main" id="{B6441292-CC6A-454A-9155-CF39B799176B}"/>
               </a:ext>
             </a:extLst>
           </p:cNvPr>
@@ -14724,7 +14790,7 @@
           <p:cNvPr id="4" name="Rectangle 3">
             <a:extLst>
               <a:ext uri="{FF2B5EF4-FFF2-40B4-BE49-F238E27FC236}">
-                <a16:creationId xmlns:a16="http://schemas.microsoft.com/office/drawing/2014/main" xmlns="" id="{5190B6BE-E3DE-924F-85E2-4454C0BEA015}"/>
+                <a16:creationId xmlns:a16="http://schemas.microsoft.com/office/drawing/2014/main" id="{5190B6BE-E3DE-924F-85E2-4454C0BEA015}"/>
               </a:ext>
             </a:extLst>
           </p:cNvPr>
@@ -14771,7 +14837,7 @@
           <p:cNvPr id="6" name="Rectangle 5">
             <a:extLst>
               <a:ext uri="{FF2B5EF4-FFF2-40B4-BE49-F238E27FC236}">
-                <a16:creationId xmlns:a16="http://schemas.microsoft.com/office/drawing/2014/main" xmlns="" id="{CB172EC8-90A6-9E44-81DB-A2C6927AA8C3}"/>
+                <a16:creationId xmlns:a16="http://schemas.microsoft.com/office/drawing/2014/main" id="{CB172EC8-90A6-9E44-81DB-A2C6927AA8C3}"/>
               </a:ext>
             </a:extLst>
           </p:cNvPr>
@@ -14959,7 +15025,7 @@
           <p:cNvPr id="4" name="Rectangle 3">
             <a:extLst>
               <a:ext uri="{FF2B5EF4-FFF2-40B4-BE49-F238E27FC236}">
-                <a16:creationId xmlns:a16="http://schemas.microsoft.com/office/drawing/2014/main" xmlns="" id="{5190B6BE-E3DE-924F-85E2-4454C0BEA015}"/>
+                <a16:creationId xmlns:a16="http://schemas.microsoft.com/office/drawing/2014/main" id="{5190B6BE-E3DE-924F-85E2-4454C0BEA015}"/>
               </a:ext>
             </a:extLst>
           </p:cNvPr>
@@ -15004,7 +15070,7 @@
           <p:cNvPr id="6" name="Rectangle 5">
             <a:extLst>
               <a:ext uri="{FF2B5EF4-FFF2-40B4-BE49-F238E27FC236}">
-                <a16:creationId xmlns:a16="http://schemas.microsoft.com/office/drawing/2014/main" xmlns="" id="{CB172EC8-90A6-9E44-81DB-A2C6927AA8C3}"/>
+                <a16:creationId xmlns:a16="http://schemas.microsoft.com/office/drawing/2014/main" id="{CB172EC8-90A6-9E44-81DB-A2C6927AA8C3}"/>
               </a:ext>
             </a:extLst>
           </p:cNvPr>
@@ -15049,7 +15115,7 @@
           <p:cNvPr id="7" name="Rectangle 6">
             <a:extLst>
               <a:ext uri="{FF2B5EF4-FFF2-40B4-BE49-F238E27FC236}">
-                <a16:creationId xmlns:a16="http://schemas.microsoft.com/office/drawing/2014/main" xmlns="" id="{B6441292-CC6A-454A-9155-CF39B799176B}"/>
+                <a16:creationId xmlns:a16="http://schemas.microsoft.com/office/drawing/2014/main" id="{B6441292-CC6A-454A-9155-CF39B799176B}"/>
               </a:ext>
             </a:extLst>
           </p:cNvPr>
@@ -15396,7 +15462,7 @@
               <p:cNvPr id="5" name="Table 4">
                 <a:extLst>
                   <a:ext uri="{FF2B5EF4-FFF2-40B4-BE49-F238E27FC236}">
-                    <a16:creationId xmlns:a16="http://schemas.microsoft.com/office/drawing/2014/main" xmlns="" id="{7807014C-46E6-304C-8B27-B66CB2B249F3}"/>
+                    <a16:creationId xmlns:a16="http://schemas.microsoft.com/office/drawing/2014/main" id="{7807014C-46E6-304C-8B27-B66CB2B249F3}"/>
                   </a:ext>
                 </a:extLst>
               </p:cNvPr>
@@ -15425,21 +15491,21 @@
                     <a:gridCol w="3505200">
                       <a:extLst>
                         <a:ext uri="{9D8B030D-6E8A-4147-A177-3AD203B41FA5}">
-                          <a16:colId xmlns:a16="http://schemas.microsoft.com/office/drawing/2014/main" xmlns="" val="2554903296"/>
+                          <a16:colId xmlns:a16="http://schemas.microsoft.com/office/drawing/2014/main" val="2554903296"/>
                         </a:ext>
                       </a:extLst>
                     </a:gridCol>
                     <a:gridCol w="3505200">
                       <a:extLst>
                         <a:ext uri="{9D8B030D-6E8A-4147-A177-3AD203B41FA5}">
-                          <a16:colId xmlns:a16="http://schemas.microsoft.com/office/drawing/2014/main" xmlns="" val="2875875809"/>
+                          <a16:colId xmlns:a16="http://schemas.microsoft.com/office/drawing/2014/main" val="2875875809"/>
                         </a:ext>
                       </a:extLst>
                     </a:gridCol>
                     <a:gridCol w="3505200">
                       <a:extLst>
                         <a:ext uri="{9D8B030D-6E8A-4147-A177-3AD203B41FA5}">
-                          <a16:colId xmlns:a16="http://schemas.microsoft.com/office/drawing/2014/main" xmlns="" val="889513335"/>
+                          <a16:colId xmlns:a16="http://schemas.microsoft.com/office/drawing/2014/main" val="889513335"/>
                         </a:ext>
                       </a:extLst>
                     </a:gridCol>
@@ -15489,7 +15555,7 @@
                     </a:tc>
                     <a:extLst>
                       <a:ext uri="{0D108BD9-81ED-4DB2-BD59-A6C34878D82A}">
-                        <a16:rowId xmlns:a16="http://schemas.microsoft.com/office/drawing/2014/main" xmlns="" val="3477367643"/>
+                        <a16:rowId xmlns:a16="http://schemas.microsoft.com/office/drawing/2014/main" val="3477367643"/>
                       </a:ext>
                     </a:extLst>
                   </a:tr>
@@ -15566,7 +15632,7 @@
                                   <m:fPr>
                                     <m:ctrlPr>
                                       <a:rPr lang="en-US" sz="2400" b="0" i="1" smtClean="0">
-                                        <a:latin typeface="Cambria Math" charset="0"/>
+                                        <a:latin typeface="Cambria Math" panose="02040503050406030204" pitchFamily="18" charset="0"/>
                                       </a:rPr>
                                     </m:ctrlPr>
                                   </m:fPr>
@@ -15597,7 +15663,7 @@
                                         <m:type m:val="skw"/>
                                         <m:ctrlPr>
                                           <a:rPr lang="en-US" sz="2400" b="0" i="1" smtClean="0">
-                                            <a:latin typeface="Cambria Math" charset="0"/>
+                                            <a:latin typeface="Cambria Math" panose="02040503050406030204" pitchFamily="18" charset="0"/>
                                             <a:ea typeface="Cambria Math" panose="02040503050406030204" pitchFamily="18" charset="0"/>
                                           </a:rPr>
                                         </m:ctrlPr>
@@ -15686,7 +15752,7 @@
                                     <m:type m:val="skw"/>
                                     <m:ctrlPr>
                                       <a:rPr lang="en-US" sz="2400" b="0" i="1" smtClean="0">
-                                        <a:latin typeface="Cambria Math" charset="0"/>
+                                        <a:latin typeface="Cambria Math" panose="02040503050406030204" pitchFamily="18" charset="0"/>
                                         <a:ea typeface="Cambria Math" panose="02040503050406030204" pitchFamily="18" charset="0"/>
                                       </a:rPr>
                                     </m:ctrlPr>
@@ -15727,7 +15793,7 @@
                     </a:tc>
                     <a:extLst>
                       <a:ext uri="{0D108BD9-81ED-4DB2-BD59-A6C34878D82A}">
-                        <a16:rowId xmlns:a16="http://schemas.microsoft.com/office/drawing/2014/main" xmlns="" val="2735426621"/>
+                        <a16:rowId xmlns:a16="http://schemas.microsoft.com/office/drawing/2014/main" val="2735426621"/>
                       </a:ext>
                     </a:extLst>
                   </a:tr>
@@ -15804,7 +15870,7 @@
                                   <m:fPr>
                                     <m:ctrlPr>
                                       <a:rPr lang="en-US" sz="2400" b="0" i="1" smtClean="0">
-                                        <a:latin typeface="Cambria Math" charset="0"/>
+                                        <a:latin typeface="Cambria Math" panose="02040503050406030204" pitchFamily="18" charset="0"/>
                                       </a:rPr>
                                     </m:ctrlPr>
                                   </m:fPr>
@@ -15835,7 +15901,7 @@
                                         <m:type m:val="skw"/>
                                         <m:ctrlPr>
                                           <a:rPr lang="en-US" sz="2400" b="0" i="1" smtClean="0">
-                                            <a:latin typeface="Cambria Math" charset="0"/>
+                                            <a:latin typeface="Cambria Math" panose="02040503050406030204" pitchFamily="18" charset="0"/>
                                             <a:ea typeface="Cambria Math" panose="02040503050406030204" pitchFamily="18" charset="0"/>
                                           </a:rPr>
                                         </m:ctrlPr>
@@ -15924,7 +15990,7 @@
                                     <m:type m:val="skw"/>
                                     <m:ctrlPr>
                                       <a:rPr lang="en-US" sz="2400" b="0" i="1" smtClean="0">
-                                        <a:latin typeface="Cambria Math" charset="0"/>
+                                        <a:latin typeface="Cambria Math" panose="02040503050406030204" pitchFamily="18" charset="0"/>
                                         <a:ea typeface="Cambria Math" panose="02040503050406030204" pitchFamily="18" charset="0"/>
                                       </a:rPr>
                                     </m:ctrlPr>
@@ -15965,7 +16031,7 @@
                     </a:tc>
                     <a:extLst>
                       <a:ext uri="{0D108BD9-81ED-4DB2-BD59-A6C34878D82A}">
-                        <a16:rowId xmlns:a16="http://schemas.microsoft.com/office/drawing/2014/main" xmlns="" val="2759665863"/>
+                        <a16:rowId xmlns:a16="http://schemas.microsoft.com/office/drawing/2014/main" val="2759665863"/>
                       </a:ext>
                     </a:extLst>
                   </a:tr>
@@ -16271,7 +16337,7 @@
           <p:cNvPr id="6" name="Rectangle 5">
             <a:extLst>
               <a:ext uri="{FF2B5EF4-FFF2-40B4-BE49-F238E27FC236}">
-                <a16:creationId xmlns:a16="http://schemas.microsoft.com/office/drawing/2014/main" xmlns="" id="{FF9B2763-F698-DD42-A9C1-C33304C189D7}"/>
+                <a16:creationId xmlns:a16="http://schemas.microsoft.com/office/drawing/2014/main" id="{FF9B2763-F698-DD42-A9C1-C33304C189D7}"/>
               </a:ext>
             </a:extLst>
           </p:cNvPr>
@@ -16352,7 +16418,7 @@
           <p:cNvPr id="4" name="Rectangle 3">
             <a:extLst>
               <a:ext uri="{FF2B5EF4-FFF2-40B4-BE49-F238E27FC236}">
-                <a16:creationId xmlns:a16="http://schemas.microsoft.com/office/drawing/2014/main" xmlns="" id="{A9A7F9C6-98E9-014F-960A-C15A15421568}"/>
+                <a16:creationId xmlns:a16="http://schemas.microsoft.com/office/drawing/2014/main" id="{A9A7F9C6-98E9-014F-960A-C15A15421568}"/>
               </a:ext>
             </a:extLst>
           </p:cNvPr>
@@ -16397,7 +16463,7 @@
           <p:cNvPr id="8" name="Rectangle 7">
             <a:extLst>
               <a:ext uri="{FF2B5EF4-FFF2-40B4-BE49-F238E27FC236}">
-                <a16:creationId xmlns:a16="http://schemas.microsoft.com/office/drawing/2014/main" xmlns="" id="{FC1B0063-8F5F-BA4C-8696-F2654F1DEBC7}"/>
+                <a16:creationId xmlns:a16="http://schemas.microsoft.com/office/drawing/2014/main" id="{FC1B0063-8F5F-BA4C-8696-F2654F1DEBC7}"/>
               </a:ext>
             </a:extLst>
           </p:cNvPr>
@@ -16443,7 +16509,7 @@
           <p:cNvPr id="9" name="Picture 8">
             <a:extLst>
               <a:ext uri="{FF2B5EF4-FFF2-40B4-BE49-F238E27FC236}">
-                <a16:creationId xmlns:a16="http://schemas.microsoft.com/office/drawing/2014/main" xmlns="" id="{BFAB5463-F60C-AA44-AA86-7F28AA0BCF64}"/>
+                <a16:creationId xmlns:a16="http://schemas.microsoft.com/office/drawing/2014/main" id="{BFAB5463-F60C-AA44-AA86-7F28AA0BCF64}"/>
               </a:ext>
             </a:extLst>
           </p:cNvPr>
@@ -16782,7 +16848,7 @@
               <p:cNvPr id="24" name="TextBox 23">
                 <a:extLst>
                   <a:ext uri="{FF2B5EF4-FFF2-40B4-BE49-F238E27FC236}">
-                    <a16:creationId xmlns:a16="http://schemas.microsoft.com/office/drawing/2014/main" xmlns="" id="{9FF2810B-44FD-F144-AC2C-A6ECE866F541}"/>
+                    <a16:creationId xmlns:a16="http://schemas.microsoft.com/office/drawing/2014/main" id="{9FF2810B-44FD-F144-AC2C-A6ECE866F541}"/>
                   </a:ext>
                 </a:extLst>
               </p:cNvPr>
@@ -16828,7 +16894,7 @@
                         <m:fPr>
                           <m:ctrlPr>
                             <a:rPr lang="en-US" sz="4000" b="0" i="1" smtClean="0">
-                              <a:latin typeface="Cambria Math" charset="0"/>
+                              <a:latin typeface="Cambria Math" panose="02040503050406030204" pitchFamily="18" charset="0"/>
                             </a:rPr>
                           </m:ctrlPr>
                         </m:fPr>
@@ -16926,7 +16992,7 @@
               <p:cNvPr id="25" name="TextBox 24">
                 <a:extLst>
                   <a:ext uri="{FF2B5EF4-FFF2-40B4-BE49-F238E27FC236}">
-                    <a16:creationId xmlns:a16="http://schemas.microsoft.com/office/drawing/2014/main" xmlns="" id="{CD847157-D552-DF44-8A4C-F555911EF531}"/>
+                    <a16:creationId xmlns:a16="http://schemas.microsoft.com/office/drawing/2014/main" id="{CD847157-D552-DF44-8A4C-F555911EF531}"/>
                   </a:ext>
                 </a:extLst>
               </p:cNvPr>
@@ -16972,7 +17038,7 @@
                         <m:fPr>
                           <m:ctrlPr>
                             <a:rPr lang="en-US" sz="4000" b="0" i="1" smtClean="0">
-                              <a:latin typeface="Cambria Math" charset="0"/>
+                              <a:latin typeface="Cambria Math" panose="02040503050406030204" pitchFamily="18" charset="0"/>
                             </a:rPr>
                           </m:ctrlPr>
                         </m:fPr>
@@ -17003,7 +17069,7 @@
                               <m:type m:val="skw"/>
                               <m:ctrlPr>
                                 <a:rPr lang="en-US" sz="4000" b="0" i="1" smtClean="0">
-                                  <a:latin typeface="Cambria Math" charset="0"/>
+                                  <a:latin typeface="Cambria Math" panose="02040503050406030204" pitchFamily="18" charset="0"/>
                                   <a:ea typeface="Cambria Math" panose="02040503050406030204" pitchFamily="18" charset="0"/>
                                 </a:rPr>
                               </m:ctrlPr>
@@ -17176,7 +17242,7 @@
           <p:cNvPr id="6" name="Rectangle 5">
             <a:extLst>
               <a:ext uri="{FF2B5EF4-FFF2-40B4-BE49-F238E27FC236}">
-                <a16:creationId xmlns:a16="http://schemas.microsoft.com/office/drawing/2014/main" xmlns="" id="{FF9B2763-F698-DD42-A9C1-C33304C189D7}"/>
+                <a16:creationId xmlns:a16="http://schemas.microsoft.com/office/drawing/2014/main" id="{FF9B2763-F698-DD42-A9C1-C33304C189D7}"/>
               </a:ext>
             </a:extLst>
           </p:cNvPr>
@@ -17257,7 +17323,7 @@
           <p:cNvPr id="4" name="Rectangle 3">
             <a:extLst>
               <a:ext uri="{FF2B5EF4-FFF2-40B4-BE49-F238E27FC236}">
-                <a16:creationId xmlns:a16="http://schemas.microsoft.com/office/drawing/2014/main" xmlns="" id="{A9A7F9C6-98E9-014F-960A-C15A15421568}"/>
+                <a16:creationId xmlns:a16="http://schemas.microsoft.com/office/drawing/2014/main" id="{A9A7F9C6-98E9-014F-960A-C15A15421568}"/>
               </a:ext>
             </a:extLst>
           </p:cNvPr>
@@ -17302,7 +17368,7 @@
           <p:cNvPr id="8" name="Rectangle 7">
             <a:extLst>
               <a:ext uri="{FF2B5EF4-FFF2-40B4-BE49-F238E27FC236}">
-                <a16:creationId xmlns:a16="http://schemas.microsoft.com/office/drawing/2014/main" xmlns="" id="{FC1B0063-8F5F-BA4C-8696-F2654F1DEBC7}"/>
+                <a16:creationId xmlns:a16="http://schemas.microsoft.com/office/drawing/2014/main" id="{FC1B0063-8F5F-BA4C-8696-F2654F1DEBC7}"/>
               </a:ext>
             </a:extLst>
           </p:cNvPr>
@@ -17348,7 +17414,7 @@
           <p:cNvPr id="9" name="Picture 8">
             <a:extLst>
               <a:ext uri="{FF2B5EF4-FFF2-40B4-BE49-F238E27FC236}">
-                <a16:creationId xmlns:a16="http://schemas.microsoft.com/office/drawing/2014/main" xmlns="" id="{BFAB5463-F60C-AA44-AA86-7F28AA0BCF64}"/>
+                <a16:creationId xmlns:a16="http://schemas.microsoft.com/office/drawing/2014/main" id="{BFAB5463-F60C-AA44-AA86-7F28AA0BCF64}"/>
               </a:ext>
             </a:extLst>
           </p:cNvPr>
@@ -17457,7 +17523,7 @@
           <p:cNvPr id="10" name="TextBox 9">
             <a:extLst>
               <a:ext uri="{FF2B5EF4-FFF2-40B4-BE49-F238E27FC236}">
-                <a16:creationId xmlns:a16="http://schemas.microsoft.com/office/drawing/2014/main" xmlns="" id="{62E219FA-28DD-894F-B184-C72CAF779949}"/>
+                <a16:creationId xmlns:a16="http://schemas.microsoft.com/office/drawing/2014/main" id="{62E219FA-28DD-894F-B184-C72CAF779949}"/>
               </a:ext>
             </a:extLst>
           </p:cNvPr>
@@ -17582,7 +17648,7 @@
           <p:cNvPr id="3" name="Rectangle 2">
             <a:extLst>
               <a:ext uri="{FF2B5EF4-FFF2-40B4-BE49-F238E27FC236}">
-                <a16:creationId xmlns:a16="http://schemas.microsoft.com/office/drawing/2014/main" xmlns="" id="{105E7469-6DC1-C542-A3A0-2B60CBF260BB}"/>
+                <a16:creationId xmlns:a16="http://schemas.microsoft.com/office/drawing/2014/main" id="{105E7469-6DC1-C542-A3A0-2B60CBF260BB}"/>
               </a:ext>
             </a:extLst>
           </p:cNvPr>
@@ -17719,7 +17785,7 @@
           <p:cNvPr id="4" name="Rectangle 3">
             <a:extLst>
               <a:ext uri="{FF2B5EF4-FFF2-40B4-BE49-F238E27FC236}">
-                <a16:creationId xmlns:a16="http://schemas.microsoft.com/office/drawing/2014/main" xmlns="" id="{1081156F-B192-4F4B-BCB9-09E835E6A1C1}"/>
+                <a16:creationId xmlns:a16="http://schemas.microsoft.com/office/drawing/2014/main" id="{1081156F-B192-4F4B-BCB9-09E835E6A1C1}"/>
               </a:ext>
             </a:extLst>
           </p:cNvPr>
@@ -17764,7 +17830,7 @@
           <p:cNvPr id="6" name="Rectangle 5">
             <a:extLst>
               <a:ext uri="{FF2B5EF4-FFF2-40B4-BE49-F238E27FC236}">
-                <a16:creationId xmlns:a16="http://schemas.microsoft.com/office/drawing/2014/main" xmlns="" id="{D5546DBD-7AD3-7842-B4F4-E45A849E60BB}"/>
+                <a16:creationId xmlns:a16="http://schemas.microsoft.com/office/drawing/2014/main" id="{D5546DBD-7AD3-7842-B4F4-E45A849E60BB}"/>
               </a:ext>
             </a:extLst>
           </p:cNvPr>
@@ -17810,7 +17876,7 @@
           <p:cNvPr id="8" name="Rectangle 7">
             <a:extLst>
               <a:ext uri="{FF2B5EF4-FFF2-40B4-BE49-F238E27FC236}">
-                <a16:creationId xmlns:a16="http://schemas.microsoft.com/office/drawing/2014/main" xmlns="" id="{5DED8DBF-5018-3743-AFB8-00DE5C7323E6}"/>
+                <a16:creationId xmlns:a16="http://schemas.microsoft.com/office/drawing/2014/main" id="{5DED8DBF-5018-3743-AFB8-00DE5C7323E6}"/>
               </a:ext>
             </a:extLst>
           </p:cNvPr>
@@ -18034,7 +18100,7 @@
           <p:cNvPr id="4" name="Rectangle 3">
             <a:extLst>
               <a:ext uri="{FF2B5EF4-FFF2-40B4-BE49-F238E27FC236}">
-                <a16:creationId xmlns:a16="http://schemas.microsoft.com/office/drawing/2014/main" xmlns="" id="{1081156F-B192-4F4B-BCB9-09E835E6A1C1}"/>
+                <a16:creationId xmlns:a16="http://schemas.microsoft.com/office/drawing/2014/main" id="{1081156F-B192-4F4B-BCB9-09E835E6A1C1}"/>
               </a:ext>
             </a:extLst>
           </p:cNvPr>
@@ -18079,7 +18145,7 @@
           <p:cNvPr id="6" name="Rectangle 5">
             <a:extLst>
               <a:ext uri="{FF2B5EF4-FFF2-40B4-BE49-F238E27FC236}">
-                <a16:creationId xmlns:a16="http://schemas.microsoft.com/office/drawing/2014/main" xmlns="" id="{D5546DBD-7AD3-7842-B4F4-E45A849E60BB}"/>
+                <a16:creationId xmlns:a16="http://schemas.microsoft.com/office/drawing/2014/main" id="{D5546DBD-7AD3-7842-B4F4-E45A849E60BB}"/>
               </a:ext>
             </a:extLst>
           </p:cNvPr>
@@ -18125,7 +18191,7 @@
           <p:cNvPr id="8" name="Rectangle 7">
             <a:extLst>
               <a:ext uri="{FF2B5EF4-FFF2-40B4-BE49-F238E27FC236}">
-                <a16:creationId xmlns:a16="http://schemas.microsoft.com/office/drawing/2014/main" xmlns="" id="{5DED8DBF-5018-3743-AFB8-00DE5C7323E6}"/>
+                <a16:creationId xmlns:a16="http://schemas.microsoft.com/office/drawing/2014/main" id="{5DED8DBF-5018-3743-AFB8-00DE5C7323E6}"/>
               </a:ext>
             </a:extLst>
           </p:cNvPr>
@@ -18231,7 +18297,7 @@
           <p:cNvPr id="7" name="Rectangle 6">
             <a:extLst>
               <a:ext uri="{FF2B5EF4-FFF2-40B4-BE49-F238E27FC236}">
-                <a16:creationId xmlns:a16="http://schemas.microsoft.com/office/drawing/2014/main" xmlns="" id="{31A2AE59-7DF8-0D44-9E88-92B8B5D75359}"/>
+                <a16:creationId xmlns:a16="http://schemas.microsoft.com/office/drawing/2014/main" id="{31A2AE59-7DF8-0D44-9E88-92B8B5D75359}"/>
               </a:ext>
             </a:extLst>
           </p:cNvPr>
@@ -18284,7 +18350,7 @@
           <p:cNvPr id="3" name="Bent-Up Arrow 2">
             <a:extLst>
               <a:ext uri="{FF2B5EF4-FFF2-40B4-BE49-F238E27FC236}">
-                <a16:creationId xmlns:a16="http://schemas.microsoft.com/office/drawing/2014/main" xmlns="" id="{50A25689-570B-BD49-972E-8E45FE19DD9D}"/>
+                <a16:creationId xmlns:a16="http://schemas.microsoft.com/office/drawing/2014/main" id="{50A25689-570B-BD49-972E-8E45FE19DD9D}"/>
               </a:ext>
             </a:extLst>
           </p:cNvPr>
@@ -18427,7 +18493,7 @@
           <p:cNvPr id="4" name="Rectangle 3">
             <a:extLst>
               <a:ext uri="{FF2B5EF4-FFF2-40B4-BE49-F238E27FC236}">
-                <a16:creationId xmlns:a16="http://schemas.microsoft.com/office/drawing/2014/main" xmlns="" id="{1081156F-B192-4F4B-BCB9-09E835E6A1C1}"/>
+                <a16:creationId xmlns:a16="http://schemas.microsoft.com/office/drawing/2014/main" id="{1081156F-B192-4F4B-BCB9-09E835E6A1C1}"/>
               </a:ext>
             </a:extLst>
           </p:cNvPr>
@@ -18472,7 +18538,7 @@
           <p:cNvPr id="6" name="Rectangle 5">
             <a:extLst>
               <a:ext uri="{FF2B5EF4-FFF2-40B4-BE49-F238E27FC236}">
-                <a16:creationId xmlns:a16="http://schemas.microsoft.com/office/drawing/2014/main" xmlns="" id="{D5546DBD-7AD3-7842-B4F4-E45A849E60BB}"/>
+                <a16:creationId xmlns:a16="http://schemas.microsoft.com/office/drawing/2014/main" id="{D5546DBD-7AD3-7842-B4F4-E45A849E60BB}"/>
               </a:ext>
             </a:extLst>
           </p:cNvPr>
@@ -18518,7 +18584,7 @@
           <p:cNvPr id="8" name="Rectangle 7">
             <a:extLst>
               <a:ext uri="{FF2B5EF4-FFF2-40B4-BE49-F238E27FC236}">
-                <a16:creationId xmlns:a16="http://schemas.microsoft.com/office/drawing/2014/main" xmlns="" id="{5DED8DBF-5018-3743-AFB8-00DE5C7323E6}"/>
+                <a16:creationId xmlns:a16="http://schemas.microsoft.com/office/drawing/2014/main" id="{5DED8DBF-5018-3743-AFB8-00DE5C7323E6}"/>
               </a:ext>
             </a:extLst>
           </p:cNvPr>
@@ -18624,7 +18690,7 @@
           <p:cNvPr id="7" name="Rectangle 6">
             <a:extLst>
               <a:ext uri="{FF2B5EF4-FFF2-40B4-BE49-F238E27FC236}">
-                <a16:creationId xmlns:a16="http://schemas.microsoft.com/office/drawing/2014/main" xmlns="" id="{9D924A2D-88FA-4740-9B03-6AC58789A717}"/>
+                <a16:creationId xmlns:a16="http://schemas.microsoft.com/office/drawing/2014/main" id="{9D924A2D-88FA-4740-9B03-6AC58789A717}"/>
               </a:ext>
             </a:extLst>
           </p:cNvPr>
@@ -18675,7 +18741,7 @@
           <p:cNvPr id="9" name="Bent-Up Arrow 8">
             <a:extLst>
               <a:ext uri="{FF2B5EF4-FFF2-40B4-BE49-F238E27FC236}">
-                <a16:creationId xmlns:a16="http://schemas.microsoft.com/office/drawing/2014/main" xmlns="" id="{7EE85762-44DB-7F48-994F-FD34F24F484A}"/>
+                <a16:creationId xmlns:a16="http://schemas.microsoft.com/office/drawing/2014/main" id="{7EE85762-44DB-7F48-994F-FD34F24F484A}"/>
               </a:ext>
             </a:extLst>
           </p:cNvPr>
@@ -18816,7 +18882,7 @@
           <p:cNvPr id="4" name="Rectangle 3">
             <a:extLst>
               <a:ext uri="{FF2B5EF4-FFF2-40B4-BE49-F238E27FC236}">
-                <a16:creationId xmlns:a16="http://schemas.microsoft.com/office/drawing/2014/main" xmlns="" id="{1081156F-B192-4F4B-BCB9-09E835E6A1C1}"/>
+                <a16:creationId xmlns:a16="http://schemas.microsoft.com/office/drawing/2014/main" id="{1081156F-B192-4F4B-BCB9-09E835E6A1C1}"/>
               </a:ext>
             </a:extLst>
           </p:cNvPr>
@@ -18861,7 +18927,7 @@
           <p:cNvPr id="6" name="Rectangle 5">
             <a:extLst>
               <a:ext uri="{FF2B5EF4-FFF2-40B4-BE49-F238E27FC236}">
-                <a16:creationId xmlns:a16="http://schemas.microsoft.com/office/drawing/2014/main" xmlns="" id="{D5546DBD-7AD3-7842-B4F4-E45A849E60BB}"/>
+                <a16:creationId xmlns:a16="http://schemas.microsoft.com/office/drawing/2014/main" id="{D5546DBD-7AD3-7842-B4F4-E45A849E60BB}"/>
               </a:ext>
             </a:extLst>
           </p:cNvPr>
@@ -18907,7 +18973,7 @@
           <p:cNvPr id="8" name="Rectangle 7">
             <a:extLst>
               <a:ext uri="{FF2B5EF4-FFF2-40B4-BE49-F238E27FC236}">
-                <a16:creationId xmlns:a16="http://schemas.microsoft.com/office/drawing/2014/main" xmlns="" id="{5DED8DBF-5018-3743-AFB8-00DE5C7323E6}"/>
+                <a16:creationId xmlns:a16="http://schemas.microsoft.com/office/drawing/2014/main" id="{5DED8DBF-5018-3743-AFB8-00DE5C7323E6}"/>
               </a:ext>
             </a:extLst>
           </p:cNvPr>
@@ -19012,7 +19078,7 @@
           <p:cNvPr id="7" name="Rectangle 6">
             <a:extLst>
               <a:ext uri="{FF2B5EF4-FFF2-40B4-BE49-F238E27FC236}">
-                <a16:creationId xmlns:a16="http://schemas.microsoft.com/office/drawing/2014/main" xmlns="" id="{66B3FFB4-DEAD-FE4C-8A8C-D7AE343CDADB}"/>
+                <a16:creationId xmlns:a16="http://schemas.microsoft.com/office/drawing/2014/main" id="{66B3FFB4-DEAD-FE4C-8A8C-D7AE343CDADB}"/>
               </a:ext>
             </a:extLst>
           </p:cNvPr>
@@ -19065,7 +19131,7 @@
           <p:cNvPr id="9" name="Bent-Up Arrow 8">
             <a:extLst>
               <a:ext uri="{FF2B5EF4-FFF2-40B4-BE49-F238E27FC236}">
-                <a16:creationId xmlns:a16="http://schemas.microsoft.com/office/drawing/2014/main" xmlns="" id="{2C9E31F0-4B9F-2643-853B-DE67A7DC9527}"/>
+                <a16:creationId xmlns:a16="http://schemas.microsoft.com/office/drawing/2014/main" id="{2C9E31F0-4B9F-2643-853B-DE67A7DC9527}"/>
               </a:ext>
             </a:extLst>
           </p:cNvPr>
@@ -19210,7 +19276,7 @@
           <p:cNvPr id="4" name="Rectangle 3">
             <a:extLst>
               <a:ext uri="{FF2B5EF4-FFF2-40B4-BE49-F238E27FC236}">
-                <a16:creationId xmlns:a16="http://schemas.microsoft.com/office/drawing/2014/main" xmlns="" id="{1081156F-B192-4F4B-BCB9-09E835E6A1C1}"/>
+                <a16:creationId xmlns:a16="http://schemas.microsoft.com/office/drawing/2014/main" id="{1081156F-B192-4F4B-BCB9-09E835E6A1C1}"/>
               </a:ext>
             </a:extLst>
           </p:cNvPr>
@@ -19255,7 +19321,7 @@
           <p:cNvPr id="6" name="Rectangle 5">
             <a:extLst>
               <a:ext uri="{FF2B5EF4-FFF2-40B4-BE49-F238E27FC236}">
-                <a16:creationId xmlns:a16="http://schemas.microsoft.com/office/drawing/2014/main" xmlns="" id="{D5546DBD-7AD3-7842-B4F4-E45A849E60BB}"/>
+                <a16:creationId xmlns:a16="http://schemas.microsoft.com/office/drawing/2014/main" id="{D5546DBD-7AD3-7842-B4F4-E45A849E60BB}"/>
               </a:ext>
             </a:extLst>
           </p:cNvPr>
@@ -19301,7 +19367,7 @@
           <p:cNvPr id="8" name="Rectangle 7">
             <a:extLst>
               <a:ext uri="{FF2B5EF4-FFF2-40B4-BE49-F238E27FC236}">
-                <a16:creationId xmlns:a16="http://schemas.microsoft.com/office/drawing/2014/main" xmlns="" id="{5DED8DBF-5018-3743-AFB8-00DE5C7323E6}"/>
+                <a16:creationId xmlns:a16="http://schemas.microsoft.com/office/drawing/2014/main" id="{5DED8DBF-5018-3743-AFB8-00DE5C7323E6}"/>
               </a:ext>
             </a:extLst>
           </p:cNvPr>
@@ -19406,7 +19472,7 @@
           <p:cNvPr id="7" name="Rectangle 6">
             <a:extLst>
               <a:ext uri="{FF2B5EF4-FFF2-40B4-BE49-F238E27FC236}">
-                <a16:creationId xmlns:a16="http://schemas.microsoft.com/office/drawing/2014/main" xmlns="" id="{5DCBD66D-DABE-6443-A731-A9C1FDB1DB62}"/>
+                <a16:creationId xmlns:a16="http://schemas.microsoft.com/office/drawing/2014/main" id="{5DCBD66D-DABE-6443-A731-A9C1FDB1DB62}"/>
               </a:ext>
             </a:extLst>
           </p:cNvPr>
@@ -19464,7 +19530,7 @@
           <p:cNvPr id="9" name="Bent-Up Arrow 8">
             <a:extLst>
               <a:ext uri="{FF2B5EF4-FFF2-40B4-BE49-F238E27FC236}">
-                <a16:creationId xmlns:a16="http://schemas.microsoft.com/office/drawing/2014/main" xmlns="" id="{73BC553A-D5F3-9540-B68F-7E47A6A14E6F}"/>
+                <a16:creationId xmlns:a16="http://schemas.microsoft.com/office/drawing/2014/main" id="{73BC553A-D5F3-9540-B68F-7E47A6A14E6F}"/>
               </a:ext>
             </a:extLst>
           </p:cNvPr>
@@ -19605,7 +19671,7 @@
           <p:cNvPr id="4" name="Rectangle 3">
             <a:extLst>
               <a:ext uri="{FF2B5EF4-FFF2-40B4-BE49-F238E27FC236}">
-                <a16:creationId xmlns:a16="http://schemas.microsoft.com/office/drawing/2014/main" xmlns="" id="{1081156F-B192-4F4B-BCB9-09E835E6A1C1}"/>
+                <a16:creationId xmlns:a16="http://schemas.microsoft.com/office/drawing/2014/main" id="{1081156F-B192-4F4B-BCB9-09E835E6A1C1}"/>
               </a:ext>
             </a:extLst>
           </p:cNvPr>
@@ -19650,7 +19716,7 @@
           <p:cNvPr id="6" name="Rectangle 5">
             <a:extLst>
               <a:ext uri="{FF2B5EF4-FFF2-40B4-BE49-F238E27FC236}">
-                <a16:creationId xmlns:a16="http://schemas.microsoft.com/office/drawing/2014/main" xmlns="" id="{D5546DBD-7AD3-7842-B4F4-E45A849E60BB}"/>
+                <a16:creationId xmlns:a16="http://schemas.microsoft.com/office/drawing/2014/main" id="{D5546DBD-7AD3-7842-B4F4-E45A849E60BB}"/>
               </a:ext>
             </a:extLst>
           </p:cNvPr>
@@ -19696,7 +19762,7 @@
           <p:cNvPr id="9" name="Rectangle 8">
             <a:extLst>
               <a:ext uri="{FF2B5EF4-FFF2-40B4-BE49-F238E27FC236}">
-                <a16:creationId xmlns:a16="http://schemas.microsoft.com/office/drawing/2014/main" xmlns="" id="{8F6F0335-ADC9-BF44-84EC-18F8A781CF8A}"/>
+                <a16:creationId xmlns:a16="http://schemas.microsoft.com/office/drawing/2014/main" id="{8F6F0335-ADC9-BF44-84EC-18F8A781CF8A}"/>
               </a:ext>
             </a:extLst>
           </p:cNvPr>
@@ -20199,7 +20265,7 @@
           <p:cNvPr id="6" name="Rectangle 5">
             <a:extLst>
               <a:ext uri="{FF2B5EF4-FFF2-40B4-BE49-F238E27FC236}">
-                <a16:creationId xmlns:a16="http://schemas.microsoft.com/office/drawing/2014/main" xmlns="" id="{A159961C-5DDD-964F-B465-83D657696EA1}"/>
+                <a16:creationId xmlns:a16="http://schemas.microsoft.com/office/drawing/2014/main" id="{A159961C-5DDD-964F-B465-83D657696EA1}"/>
               </a:ext>
             </a:extLst>
           </p:cNvPr>
@@ -20246,7 +20312,7 @@
               <p:cNvPr id="4" name="Table 3">
                 <a:extLst>
                   <a:ext uri="{FF2B5EF4-FFF2-40B4-BE49-F238E27FC236}">
-                    <a16:creationId xmlns:a16="http://schemas.microsoft.com/office/drawing/2014/main" xmlns="" id="{B563A970-47AB-5240-8D7D-5CA9ADBBEFDA}"/>
+                    <a16:creationId xmlns:a16="http://schemas.microsoft.com/office/drawing/2014/main" id="{B563A970-47AB-5240-8D7D-5CA9ADBBEFDA}"/>
                   </a:ext>
                 </a:extLst>
               </p:cNvPr>
@@ -20269,28 +20335,28 @@
                     <a:gridCol w="1884130">
                       <a:extLst>
                         <a:ext uri="{9D8B030D-6E8A-4147-A177-3AD203B41FA5}">
-                          <a16:colId xmlns:a16="http://schemas.microsoft.com/office/drawing/2014/main" xmlns="" val="1603415222"/>
+                          <a16:colId xmlns:a16="http://schemas.microsoft.com/office/drawing/2014/main" val="1603415222"/>
                         </a:ext>
                       </a:extLst>
                     </a:gridCol>
                     <a:gridCol w="3022264">
                       <a:extLst>
                         <a:ext uri="{9D8B030D-6E8A-4147-A177-3AD203B41FA5}">
-                          <a16:colId xmlns:a16="http://schemas.microsoft.com/office/drawing/2014/main" xmlns="" val="2896810510"/>
+                          <a16:colId xmlns:a16="http://schemas.microsoft.com/office/drawing/2014/main" val="2896810510"/>
                         </a:ext>
                       </a:extLst>
                     </a:gridCol>
                     <a:gridCol w="2983351">
                       <a:extLst>
                         <a:ext uri="{9D8B030D-6E8A-4147-A177-3AD203B41FA5}">
-                          <a16:colId xmlns:a16="http://schemas.microsoft.com/office/drawing/2014/main" xmlns="" val="1060877502"/>
+                          <a16:colId xmlns:a16="http://schemas.microsoft.com/office/drawing/2014/main" val="1060877502"/>
                         </a:ext>
                       </a:extLst>
                     </a:gridCol>
                     <a:gridCol w="3048207">
                       <a:extLst>
                         <a:ext uri="{9D8B030D-6E8A-4147-A177-3AD203B41FA5}">
-                          <a16:colId xmlns:a16="http://schemas.microsoft.com/office/drawing/2014/main" xmlns="" val="1462196635"/>
+                          <a16:colId xmlns:a16="http://schemas.microsoft.com/office/drawing/2014/main" val="1462196635"/>
                         </a:ext>
                       </a:extLst>
                     </a:gridCol>
@@ -20350,7 +20416,7 @@
                     </a:tc>
                     <a:extLst>
                       <a:ext uri="{0D108BD9-81ED-4DB2-BD59-A6C34878D82A}">
-                        <a16:rowId xmlns:a16="http://schemas.microsoft.com/office/drawing/2014/main" xmlns="" val="2538790727"/>
+                        <a16:rowId xmlns:a16="http://schemas.microsoft.com/office/drawing/2014/main" val="2538790727"/>
                       </a:ext>
                     </a:extLst>
                   </a:tr>
@@ -20384,7 +20450,7 @@
                                   <m:sSubPr>
                                     <m:ctrlPr>
                                       <a:rPr lang="en-US" sz="2400" b="0" i="1" smtClean="0">
-                                        <a:latin typeface="Cambria Math" charset="0"/>
+                                        <a:latin typeface="Cambria Math" panose="02040503050406030204" pitchFamily="18" charset="0"/>
                                       </a:rPr>
                                     </m:ctrlPr>
                                   </m:sSubPr>
@@ -20415,7 +20481,7 @@
                                   <m:sSubPr>
                                     <m:ctrlPr>
                                       <a:rPr lang="en-US" sz="2400" b="0" i="1" smtClean="0">
-                                        <a:latin typeface="Cambria Math" charset="0"/>
+                                        <a:latin typeface="Cambria Math" panose="02040503050406030204" pitchFamily="18" charset="0"/>
                                       </a:rPr>
                                     </m:ctrlPr>
                                   </m:sSubPr>
@@ -20472,7 +20538,7 @@
                     </a:tc>
                     <a:extLst>
                       <a:ext uri="{0D108BD9-81ED-4DB2-BD59-A6C34878D82A}">
-                        <a16:rowId xmlns:a16="http://schemas.microsoft.com/office/drawing/2014/main" xmlns="" val="2589195531"/>
+                        <a16:rowId xmlns:a16="http://schemas.microsoft.com/office/drawing/2014/main" val="2589195531"/>
                       </a:ext>
                     </a:extLst>
                   </a:tr>
@@ -20522,7 +20588,7 @@
                                   <m:sSubPr>
                                     <m:ctrlPr>
                                       <a:rPr lang="en-US" sz="2400" b="0" i="1" smtClean="0">
-                                        <a:latin typeface="Cambria Math" charset="0"/>
+                                        <a:latin typeface="Cambria Math" panose="02040503050406030204" pitchFamily="18" charset="0"/>
                                       </a:rPr>
                                     </m:ctrlPr>
                                   </m:sSubPr>
@@ -20553,7 +20619,7 @@
                                   <m:sSubPr>
                                     <m:ctrlPr>
                                       <a:rPr lang="en-US" sz="2400" b="0" i="1" smtClean="0">
-                                        <a:latin typeface="Cambria Math" charset="0"/>
+                                        <a:latin typeface="Cambria Math" panose="02040503050406030204" pitchFamily="18" charset="0"/>
                                       </a:rPr>
                                     </m:ctrlPr>
                                   </m:sSubPr>
@@ -20621,7 +20687,7 @@
                     </a:tc>
                     <a:extLst>
                       <a:ext uri="{0D108BD9-81ED-4DB2-BD59-A6C34878D82A}">
-                        <a16:rowId xmlns:a16="http://schemas.microsoft.com/office/drawing/2014/main" xmlns="" val="3426463444"/>
+                        <a16:rowId xmlns:a16="http://schemas.microsoft.com/office/drawing/2014/main" val="3426463444"/>
                       </a:ext>
                     </a:extLst>
                   </a:tr>
@@ -20978,7 +21044,7 @@
           <p:cNvPr id="10" name="TextBox 9">
             <a:extLst>
               <a:ext uri="{FF2B5EF4-FFF2-40B4-BE49-F238E27FC236}">
-                <a16:creationId xmlns:a16="http://schemas.microsoft.com/office/drawing/2014/main" xmlns="" id="{62E219FA-28DD-894F-B184-C72CAF779949}"/>
+                <a16:creationId xmlns:a16="http://schemas.microsoft.com/office/drawing/2014/main" id="{62E219FA-28DD-894F-B184-C72CAF779949}"/>
               </a:ext>
             </a:extLst>
           </p:cNvPr>
@@ -21020,7 +21086,7 @@
           <p:cNvPr id="6" name="Rectangle 5">
             <a:extLst>
               <a:ext uri="{FF2B5EF4-FFF2-40B4-BE49-F238E27FC236}">
-                <a16:creationId xmlns:a16="http://schemas.microsoft.com/office/drawing/2014/main" xmlns="" id="{493688BE-EDBB-194C-A65F-1FF9EB5458BC}"/>
+                <a16:creationId xmlns:a16="http://schemas.microsoft.com/office/drawing/2014/main" id="{493688BE-EDBB-194C-A65F-1FF9EB5458BC}"/>
               </a:ext>
             </a:extLst>
           </p:cNvPr>
@@ -21065,7 +21131,7 @@
           <p:cNvPr id="7" name="TextBox 6">
             <a:extLst>
               <a:ext uri="{FF2B5EF4-FFF2-40B4-BE49-F238E27FC236}">
-                <a16:creationId xmlns:a16="http://schemas.microsoft.com/office/drawing/2014/main" xmlns="" id="{FF438587-A1B4-254C-9577-8F13D20ACF57}"/>
+                <a16:creationId xmlns:a16="http://schemas.microsoft.com/office/drawing/2014/main" id="{FF438587-A1B4-254C-9577-8F13D20ACF57}"/>
               </a:ext>
             </a:extLst>
           </p:cNvPr>
@@ -21107,7 +21173,7 @@
           <p:cNvPr id="4" name="Picture 3">
             <a:extLst>
               <a:ext uri="{FF2B5EF4-FFF2-40B4-BE49-F238E27FC236}">
-                <a16:creationId xmlns:a16="http://schemas.microsoft.com/office/drawing/2014/main" xmlns="" id="{202641BF-5204-D943-ADA1-8B35103617C5}"/>
+                <a16:creationId xmlns:a16="http://schemas.microsoft.com/office/drawing/2014/main" id="{202641BF-5204-D943-ADA1-8B35103617C5}"/>
               </a:ext>
             </a:extLst>
           </p:cNvPr>
@@ -21137,7 +21203,7 @@
           <p:cNvPr id="16" name="Group 15">
             <a:extLst>
               <a:ext uri="{FF2B5EF4-FFF2-40B4-BE49-F238E27FC236}">
-                <a16:creationId xmlns:a16="http://schemas.microsoft.com/office/drawing/2014/main" xmlns="" id="{DFF30F44-F0BF-B44E-8D92-0576089E12D6}"/>
+                <a16:creationId xmlns:a16="http://schemas.microsoft.com/office/drawing/2014/main" id="{DFF30F44-F0BF-B44E-8D92-0576089E12D6}"/>
               </a:ext>
             </a:extLst>
           </p:cNvPr>
@@ -21157,7 +21223,7 @@
             <p:cNvPr id="9" name="Straight Connector 8">
               <a:extLst>
                 <a:ext uri="{FF2B5EF4-FFF2-40B4-BE49-F238E27FC236}">
-                  <a16:creationId xmlns:a16="http://schemas.microsoft.com/office/drawing/2014/main" xmlns="" id="{1EACB965-EDD4-144F-B457-4B76AFFA7CD9}"/>
+                  <a16:creationId xmlns:a16="http://schemas.microsoft.com/office/drawing/2014/main" id="{1EACB965-EDD4-144F-B457-4B76AFFA7CD9}"/>
                 </a:ext>
               </a:extLst>
             </p:cNvPr>
@@ -21198,7 +21264,7 @@
             <p:cNvPr id="11" name="Straight Connector 10">
               <a:extLst>
                 <a:ext uri="{FF2B5EF4-FFF2-40B4-BE49-F238E27FC236}">
-                  <a16:creationId xmlns:a16="http://schemas.microsoft.com/office/drawing/2014/main" xmlns="" id="{F3606A8A-B9B0-DC46-AD0F-C461285DCCE6}"/>
+                  <a16:creationId xmlns:a16="http://schemas.microsoft.com/office/drawing/2014/main" id="{F3606A8A-B9B0-DC46-AD0F-C461285DCCE6}"/>
                 </a:ext>
               </a:extLst>
             </p:cNvPr>
@@ -21239,7 +21305,7 @@
             <p:cNvPr id="13" name="Straight Arrow Connector 12">
               <a:extLst>
                 <a:ext uri="{FF2B5EF4-FFF2-40B4-BE49-F238E27FC236}">
-                  <a16:creationId xmlns:a16="http://schemas.microsoft.com/office/drawing/2014/main" xmlns="" id="{9A029505-ECD9-D747-83AD-B60B39342FAF}"/>
+                  <a16:creationId xmlns:a16="http://schemas.microsoft.com/office/drawing/2014/main" id="{9A029505-ECD9-D747-83AD-B60B39342FAF}"/>
                 </a:ext>
               </a:extLst>
             </p:cNvPr>
@@ -21281,7 +21347,7 @@
             <p:cNvPr id="14" name="Straight Arrow Connector 13">
               <a:extLst>
                 <a:ext uri="{FF2B5EF4-FFF2-40B4-BE49-F238E27FC236}">
-                  <a16:creationId xmlns:a16="http://schemas.microsoft.com/office/drawing/2014/main" xmlns="" id="{7C1E1FE6-AB1B-AC4D-8135-732760347ED8}"/>
+                  <a16:creationId xmlns:a16="http://schemas.microsoft.com/office/drawing/2014/main" id="{7C1E1FE6-AB1B-AC4D-8135-732760347ED8}"/>
                 </a:ext>
               </a:extLst>
             </p:cNvPr>
@@ -21552,7 +21618,7 @@
           <p:cNvPr id="6" name="TextBox 5">
             <a:extLst>
               <a:ext uri="{FF2B5EF4-FFF2-40B4-BE49-F238E27FC236}">
-                <a16:creationId xmlns:a16="http://schemas.microsoft.com/office/drawing/2014/main" xmlns="" id="{50BD6FF3-A519-5444-B733-6E10BCA55F75}"/>
+                <a16:creationId xmlns:a16="http://schemas.microsoft.com/office/drawing/2014/main" id="{50BD6FF3-A519-5444-B733-6E10BCA55F75}"/>
               </a:ext>
             </a:extLst>
           </p:cNvPr>
@@ -21673,7 +21739,7 @@
               <p:cNvPr id="3" name="TextBox 2">
                 <a:extLst>
                   <a:ext uri="{FF2B5EF4-FFF2-40B4-BE49-F238E27FC236}">
-                    <a16:creationId xmlns:a16="http://schemas.microsoft.com/office/drawing/2014/main" xmlns="" id="{CA919DC5-F382-C84B-852B-EE3DB37B7DA1}"/>
+                    <a16:creationId xmlns:a16="http://schemas.microsoft.com/office/drawing/2014/main" id="{CA919DC5-F382-C84B-852B-EE3DB37B7DA1}"/>
                   </a:ext>
                 </a:extLst>
               </p:cNvPr>
@@ -21719,7 +21785,7 @@
                         <m:fPr>
                           <m:ctrlPr>
                             <a:rPr lang="en-US" sz="4000" b="0" i="1" smtClean="0">
-                              <a:latin typeface="Cambria Math" charset="0"/>
+                              <a:latin typeface="Cambria Math" panose="02040503050406030204" pitchFamily="18" charset="0"/>
                             </a:rPr>
                           </m:ctrlPr>
                         </m:fPr>
@@ -21904,7 +21970,7 @@
           <p:cNvPr id="10" name="TextBox 9">
             <a:extLst>
               <a:ext uri="{FF2B5EF4-FFF2-40B4-BE49-F238E27FC236}">
-                <a16:creationId xmlns:a16="http://schemas.microsoft.com/office/drawing/2014/main" xmlns="" id="{62E219FA-28DD-894F-B184-C72CAF779949}"/>
+                <a16:creationId xmlns:a16="http://schemas.microsoft.com/office/drawing/2014/main" id="{62E219FA-28DD-894F-B184-C72CAF779949}"/>
               </a:ext>
             </a:extLst>
           </p:cNvPr>
@@ -21946,7 +22012,7 @@
           <p:cNvPr id="6" name="Rectangle 5">
             <a:extLst>
               <a:ext uri="{FF2B5EF4-FFF2-40B4-BE49-F238E27FC236}">
-                <a16:creationId xmlns:a16="http://schemas.microsoft.com/office/drawing/2014/main" xmlns="" id="{493688BE-EDBB-194C-A65F-1FF9EB5458BC}"/>
+                <a16:creationId xmlns:a16="http://schemas.microsoft.com/office/drawing/2014/main" id="{493688BE-EDBB-194C-A65F-1FF9EB5458BC}"/>
               </a:ext>
             </a:extLst>
           </p:cNvPr>
@@ -21991,7 +22057,7 @@
           <p:cNvPr id="3" name="Rectangle 2">
             <a:extLst>
               <a:ext uri="{FF2B5EF4-FFF2-40B4-BE49-F238E27FC236}">
-                <a16:creationId xmlns:a16="http://schemas.microsoft.com/office/drawing/2014/main" xmlns="" id="{5B22A8B7-52ED-AE4F-B7DC-BAF11CD6864F}"/>
+                <a16:creationId xmlns:a16="http://schemas.microsoft.com/office/drawing/2014/main" id="{5B22A8B7-52ED-AE4F-B7DC-BAF11CD6864F}"/>
               </a:ext>
             </a:extLst>
           </p:cNvPr>
@@ -22033,7 +22099,7 @@
           <p:cNvPr id="8" name="Bent-Up Arrow 7">
             <a:extLst>
               <a:ext uri="{FF2B5EF4-FFF2-40B4-BE49-F238E27FC236}">
-                <a16:creationId xmlns:a16="http://schemas.microsoft.com/office/drawing/2014/main" xmlns="" id="{D257471F-D048-1E4A-BF69-57B6A7011981}"/>
+                <a16:creationId xmlns:a16="http://schemas.microsoft.com/office/drawing/2014/main" id="{D257471F-D048-1E4A-BF69-57B6A7011981}"/>
               </a:ext>
             </a:extLst>
           </p:cNvPr>
@@ -22176,7 +22242,7 @@
           <p:cNvPr id="10" name="TextBox 9">
             <a:extLst>
               <a:ext uri="{FF2B5EF4-FFF2-40B4-BE49-F238E27FC236}">
-                <a16:creationId xmlns:a16="http://schemas.microsoft.com/office/drawing/2014/main" xmlns="" id="{62E219FA-28DD-894F-B184-C72CAF779949}"/>
+                <a16:creationId xmlns:a16="http://schemas.microsoft.com/office/drawing/2014/main" id="{62E219FA-28DD-894F-B184-C72CAF779949}"/>
               </a:ext>
             </a:extLst>
           </p:cNvPr>
@@ -22218,7 +22284,7 @@
           <p:cNvPr id="6" name="Rectangle 5">
             <a:extLst>
               <a:ext uri="{FF2B5EF4-FFF2-40B4-BE49-F238E27FC236}">
-                <a16:creationId xmlns:a16="http://schemas.microsoft.com/office/drawing/2014/main" xmlns="" id="{493688BE-EDBB-194C-A65F-1FF9EB5458BC}"/>
+                <a16:creationId xmlns:a16="http://schemas.microsoft.com/office/drawing/2014/main" id="{493688BE-EDBB-194C-A65F-1FF9EB5458BC}"/>
               </a:ext>
             </a:extLst>
           </p:cNvPr>
@@ -22263,7 +22329,7 @@
           <p:cNvPr id="7" name="TextBox 6">
             <a:extLst>
               <a:ext uri="{FF2B5EF4-FFF2-40B4-BE49-F238E27FC236}">
-                <a16:creationId xmlns:a16="http://schemas.microsoft.com/office/drawing/2014/main" xmlns="" id="{FF438587-A1B4-254C-9577-8F13D20ACF57}"/>
+                <a16:creationId xmlns:a16="http://schemas.microsoft.com/office/drawing/2014/main" id="{FF438587-A1B4-254C-9577-8F13D20ACF57}"/>
               </a:ext>
             </a:extLst>
           </p:cNvPr>
@@ -22341,7 +22407,7 @@
           <p:cNvPr id="3" name="Rectangle 2">
             <a:extLst>
               <a:ext uri="{FF2B5EF4-FFF2-40B4-BE49-F238E27FC236}">
-                <a16:creationId xmlns:a16="http://schemas.microsoft.com/office/drawing/2014/main" xmlns="" id="{5B22A8B7-52ED-AE4F-B7DC-BAF11CD6864F}"/>
+                <a16:creationId xmlns:a16="http://schemas.microsoft.com/office/drawing/2014/main" id="{5B22A8B7-52ED-AE4F-B7DC-BAF11CD6864F}"/>
               </a:ext>
             </a:extLst>
           </p:cNvPr>
@@ -22387,7 +22453,7 @@
           <p:cNvPr id="8" name="Bent-Up Arrow 7">
             <a:extLst>
               <a:ext uri="{FF2B5EF4-FFF2-40B4-BE49-F238E27FC236}">
-                <a16:creationId xmlns:a16="http://schemas.microsoft.com/office/drawing/2014/main" xmlns="" id="{D257471F-D048-1E4A-BF69-57B6A7011981}"/>
+                <a16:creationId xmlns:a16="http://schemas.microsoft.com/office/drawing/2014/main" id="{D257471F-D048-1E4A-BF69-57B6A7011981}"/>
               </a:ext>
             </a:extLst>
           </p:cNvPr>
@@ -22443,7 +22509,7 @@
               <p:cNvPr id="11" name="TextBox 10">
                 <a:extLst>
                   <a:ext uri="{FF2B5EF4-FFF2-40B4-BE49-F238E27FC236}">
-                    <a16:creationId xmlns:a16="http://schemas.microsoft.com/office/drawing/2014/main" xmlns="" id="{EEB19899-03D0-594E-A69F-17CDEE5524C0}"/>
+                    <a16:creationId xmlns:a16="http://schemas.microsoft.com/office/drawing/2014/main" id="{EEB19899-03D0-594E-A69F-17CDEE5524C0}"/>
                   </a:ext>
                 </a:extLst>
               </p:cNvPr>
@@ -22593,7 +22659,7 @@
           <p:cNvPr id="4" name="Picture 3">
             <a:extLst>
               <a:ext uri="{FF2B5EF4-FFF2-40B4-BE49-F238E27FC236}">
-                <a16:creationId xmlns:a16="http://schemas.microsoft.com/office/drawing/2014/main" xmlns="" id="{01A4C130-251F-A240-9F5C-5729A5F2FE6C}"/>
+                <a16:creationId xmlns:a16="http://schemas.microsoft.com/office/drawing/2014/main" id="{01A4C130-251F-A240-9F5C-5729A5F2FE6C}"/>
               </a:ext>
             </a:extLst>
           </p:cNvPr>
@@ -22929,7 +22995,7 @@
           <p:cNvPr id="10" name="TextBox 9">
             <a:extLst>
               <a:ext uri="{FF2B5EF4-FFF2-40B4-BE49-F238E27FC236}">
-                <a16:creationId xmlns:a16="http://schemas.microsoft.com/office/drawing/2014/main" xmlns="" id="{62E219FA-28DD-894F-B184-C72CAF779949}"/>
+                <a16:creationId xmlns:a16="http://schemas.microsoft.com/office/drawing/2014/main" id="{62E219FA-28DD-894F-B184-C72CAF779949}"/>
               </a:ext>
             </a:extLst>
           </p:cNvPr>
@@ -22971,7 +23037,7 @@
           <p:cNvPr id="6" name="Rectangle 5">
             <a:extLst>
               <a:ext uri="{FF2B5EF4-FFF2-40B4-BE49-F238E27FC236}">
-                <a16:creationId xmlns:a16="http://schemas.microsoft.com/office/drawing/2014/main" xmlns="" id="{493688BE-EDBB-194C-A65F-1FF9EB5458BC}"/>
+                <a16:creationId xmlns:a16="http://schemas.microsoft.com/office/drawing/2014/main" id="{493688BE-EDBB-194C-A65F-1FF9EB5458BC}"/>
               </a:ext>
             </a:extLst>
           </p:cNvPr>
@@ -23016,7 +23082,7 @@
           <p:cNvPr id="7" name="TextBox 6">
             <a:extLst>
               <a:ext uri="{FF2B5EF4-FFF2-40B4-BE49-F238E27FC236}">
-                <a16:creationId xmlns:a16="http://schemas.microsoft.com/office/drawing/2014/main" xmlns="" id="{FF438587-A1B4-254C-9577-8F13D20ACF57}"/>
+                <a16:creationId xmlns:a16="http://schemas.microsoft.com/office/drawing/2014/main" id="{FF438587-A1B4-254C-9577-8F13D20ACF57}"/>
               </a:ext>
             </a:extLst>
           </p:cNvPr>
@@ -23094,7 +23160,7 @@
           <p:cNvPr id="3" name="Rectangle 2">
             <a:extLst>
               <a:ext uri="{FF2B5EF4-FFF2-40B4-BE49-F238E27FC236}">
-                <a16:creationId xmlns:a16="http://schemas.microsoft.com/office/drawing/2014/main" xmlns="" id="{5B22A8B7-52ED-AE4F-B7DC-BAF11CD6864F}"/>
+                <a16:creationId xmlns:a16="http://schemas.microsoft.com/office/drawing/2014/main" id="{5B22A8B7-52ED-AE4F-B7DC-BAF11CD6864F}"/>
               </a:ext>
             </a:extLst>
           </p:cNvPr>
@@ -23140,7 +23206,7 @@
           <p:cNvPr id="8" name="Bent-Up Arrow 7">
             <a:extLst>
               <a:ext uri="{FF2B5EF4-FFF2-40B4-BE49-F238E27FC236}">
-                <a16:creationId xmlns:a16="http://schemas.microsoft.com/office/drawing/2014/main" xmlns="" id="{D257471F-D048-1E4A-BF69-57B6A7011981}"/>
+                <a16:creationId xmlns:a16="http://schemas.microsoft.com/office/drawing/2014/main" id="{D257471F-D048-1E4A-BF69-57B6A7011981}"/>
               </a:ext>
             </a:extLst>
           </p:cNvPr>
@@ -23196,7 +23262,7 @@
               <p:cNvPr id="11" name="TextBox 10">
                 <a:extLst>
                   <a:ext uri="{FF2B5EF4-FFF2-40B4-BE49-F238E27FC236}">
-                    <a16:creationId xmlns:a16="http://schemas.microsoft.com/office/drawing/2014/main" xmlns="" id="{EEB19899-03D0-594E-A69F-17CDEE5524C0}"/>
+                    <a16:creationId xmlns:a16="http://schemas.microsoft.com/office/drawing/2014/main" id="{EEB19899-03D0-594E-A69F-17CDEE5524C0}"/>
                   </a:ext>
                 </a:extLst>
               </p:cNvPr>
@@ -23346,7 +23412,7 @@
           <p:cNvPr id="4" name="Picture 3">
             <a:extLst>
               <a:ext uri="{FF2B5EF4-FFF2-40B4-BE49-F238E27FC236}">
-                <a16:creationId xmlns:a16="http://schemas.microsoft.com/office/drawing/2014/main" xmlns="" id="{01A4C130-251F-A240-9F5C-5729A5F2FE6C}"/>
+                <a16:creationId xmlns:a16="http://schemas.microsoft.com/office/drawing/2014/main" id="{01A4C130-251F-A240-9F5C-5729A5F2FE6C}"/>
               </a:ext>
             </a:extLst>
           </p:cNvPr>
@@ -23376,7 +23442,7 @@
           <p:cNvPr id="9" name="Rectangle 8">
             <a:extLst>
               <a:ext uri="{FF2B5EF4-FFF2-40B4-BE49-F238E27FC236}">
-                <a16:creationId xmlns:a16="http://schemas.microsoft.com/office/drawing/2014/main" xmlns="" id="{CA2A4470-CB93-2B42-A638-EB9FC4F7DE82}"/>
+                <a16:creationId xmlns:a16="http://schemas.microsoft.com/office/drawing/2014/main" id="{CA2A4470-CB93-2B42-A638-EB9FC4F7DE82}"/>
               </a:ext>
             </a:extLst>
           </p:cNvPr>
@@ -23428,7 +23494,7 @@
           <p:cNvPr id="13" name="Straight Arrow Connector 12">
             <a:extLst>
               <a:ext uri="{FF2B5EF4-FFF2-40B4-BE49-F238E27FC236}">
-                <a16:creationId xmlns:a16="http://schemas.microsoft.com/office/drawing/2014/main" xmlns="" id="{8DA1644A-62B4-2F44-A523-8F0FB38AFD87}"/>
+                <a16:creationId xmlns:a16="http://schemas.microsoft.com/office/drawing/2014/main" id="{8DA1644A-62B4-2F44-A523-8F0FB38AFD87}"/>
               </a:ext>
             </a:extLst>
           </p:cNvPr>
@@ -23470,7 +23536,7 @@
           <p:cNvPr id="14" name="Straight Arrow Connector 13">
             <a:extLst>
               <a:ext uri="{FF2B5EF4-FFF2-40B4-BE49-F238E27FC236}">
-                <a16:creationId xmlns:a16="http://schemas.microsoft.com/office/drawing/2014/main" xmlns="" id="{16A54438-4AB6-4C47-90D2-C95BC0D47307}"/>
+                <a16:creationId xmlns:a16="http://schemas.microsoft.com/office/drawing/2014/main" id="{16A54438-4AB6-4C47-90D2-C95BC0D47307}"/>
               </a:ext>
             </a:extLst>
           </p:cNvPr>
@@ -23820,7 +23886,7 @@
           <p:cNvPr id="10" name="TextBox 9">
             <a:extLst>
               <a:ext uri="{FF2B5EF4-FFF2-40B4-BE49-F238E27FC236}">
-                <a16:creationId xmlns:a16="http://schemas.microsoft.com/office/drawing/2014/main" xmlns="" id="{62E219FA-28DD-894F-B184-C72CAF779949}"/>
+                <a16:creationId xmlns:a16="http://schemas.microsoft.com/office/drawing/2014/main" id="{62E219FA-28DD-894F-B184-C72CAF779949}"/>
               </a:ext>
             </a:extLst>
           </p:cNvPr>
@@ -23862,7 +23928,7 @@
           <p:cNvPr id="6" name="Rectangle 5">
             <a:extLst>
               <a:ext uri="{FF2B5EF4-FFF2-40B4-BE49-F238E27FC236}">
-                <a16:creationId xmlns:a16="http://schemas.microsoft.com/office/drawing/2014/main" xmlns="" id="{493688BE-EDBB-194C-A65F-1FF9EB5458BC}"/>
+                <a16:creationId xmlns:a16="http://schemas.microsoft.com/office/drawing/2014/main" id="{493688BE-EDBB-194C-A65F-1FF9EB5458BC}"/>
               </a:ext>
             </a:extLst>
           </p:cNvPr>
@@ -23907,7 +23973,7 @@
           <p:cNvPr id="3" name="Rectangle 2">
             <a:extLst>
               <a:ext uri="{FF2B5EF4-FFF2-40B4-BE49-F238E27FC236}">
-                <a16:creationId xmlns:a16="http://schemas.microsoft.com/office/drawing/2014/main" xmlns="" id="{5B22A8B7-52ED-AE4F-B7DC-BAF11CD6864F}"/>
+                <a16:creationId xmlns:a16="http://schemas.microsoft.com/office/drawing/2014/main" id="{5B22A8B7-52ED-AE4F-B7DC-BAF11CD6864F}"/>
               </a:ext>
             </a:extLst>
           </p:cNvPr>
@@ -23949,7 +24015,7 @@
           <p:cNvPr id="8" name="Bent-Up Arrow 7">
             <a:extLst>
               <a:ext uri="{FF2B5EF4-FFF2-40B4-BE49-F238E27FC236}">
-                <a16:creationId xmlns:a16="http://schemas.microsoft.com/office/drawing/2014/main" xmlns="" id="{D257471F-D048-1E4A-BF69-57B6A7011981}"/>
+                <a16:creationId xmlns:a16="http://schemas.microsoft.com/office/drawing/2014/main" id="{D257471F-D048-1E4A-BF69-57B6A7011981}"/>
               </a:ext>
             </a:extLst>
           </p:cNvPr>
@@ -24005,7 +24071,7 @@
               <p:cNvPr id="15" name="TextBox 14">
                 <a:extLst>
                   <a:ext uri="{FF2B5EF4-FFF2-40B4-BE49-F238E27FC236}">
-                    <a16:creationId xmlns:a16="http://schemas.microsoft.com/office/drawing/2014/main" xmlns="" id="{A859C593-0A2A-F446-8958-62BF8AE58024}"/>
+                    <a16:creationId xmlns:a16="http://schemas.microsoft.com/office/drawing/2014/main" id="{A859C593-0A2A-F446-8958-62BF8AE58024}"/>
                   </a:ext>
                 </a:extLst>
               </p:cNvPr>
@@ -24042,7 +24108,7 @@
                               <a:solidFill>
                                 <a:schemeClr val="tx2"/>
                               </a:solidFill>
-                              <a:latin typeface="Cambria Math" charset="0"/>
+                              <a:latin typeface="Cambria Math" panose="02040503050406030204" pitchFamily="18" charset="0"/>
                               <a:ea typeface="Consolas" charset="0"/>
                               <a:cs typeface="Consolas" charset="0"/>
                             </a:rPr>
@@ -24208,7 +24274,7 @@
               <p:cNvPr id="17" name="TextBox 16">
                 <a:extLst>
                   <a:ext uri="{FF2B5EF4-FFF2-40B4-BE49-F238E27FC236}">
-                    <a16:creationId xmlns:a16="http://schemas.microsoft.com/office/drawing/2014/main" xmlns="" id="{19992B36-EAD2-D649-B2E9-3701DA3B545B}"/>
+                    <a16:creationId xmlns:a16="http://schemas.microsoft.com/office/drawing/2014/main" id="{19992B36-EAD2-D649-B2E9-3701DA3B545B}"/>
                   </a:ext>
                 </a:extLst>
               </p:cNvPr>
@@ -24317,7 +24383,7 @@
                               <a:solidFill>
                                 <a:schemeClr val="accent6"/>
                               </a:solidFill>
-                              <a:latin typeface="Cambria Math" charset="0"/>
+                              <a:latin typeface="Cambria Math" panose="02040503050406030204" pitchFamily="18" charset="0"/>
                               <a:ea typeface="Consolas" charset="0"/>
                               <a:cs typeface="Consolas" charset="0"/>
                             </a:rPr>
@@ -24720,7 +24786,7 @@
               <p:cNvPr id="10" name="TextBox 9">
                 <a:extLst>
                   <a:ext uri="{FF2B5EF4-FFF2-40B4-BE49-F238E27FC236}">
-                    <a16:creationId xmlns:a16="http://schemas.microsoft.com/office/drawing/2014/main" xmlns="" id="{62E219FA-28DD-894F-B184-C72CAF779949}"/>
+                    <a16:creationId xmlns:a16="http://schemas.microsoft.com/office/drawing/2014/main" id="{62E219FA-28DD-894F-B184-C72CAF779949}"/>
                   </a:ext>
                 </a:extLst>
               </p:cNvPr>
@@ -24835,7 +24901,7 @@
           <p:cNvPr id="6" name="Rectangle 5">
             <a:extLst>
               <a:ext uri="{FF2B5EF4-FFF2-40B4-BE49-F238E27FC236}">
-                <a16:creationId xmlns:a16="http://schemas.microsoft.com/office/drawing/2014/main" xmlns="" id="{0474D595-141C-6849-A646-28B542DAD5D5}"/>
+                <a16:creationId xmlns:a16="http://schemas.microsoft.com/office/drawing/2014/main" id="{0474D595-141C-6849-A646-28B542DAD5D5}"/>
               </a:ext>
             </a:extLst>
           </p:cNvPr>
@@ -24882,7 +24948,7 @@
               <p:cNvPr id="7" name="TextBox 6">
                 <a:extLst>
                   <a:ext uri="{FF2B5EF4-FFF2-40B4-BE49-F238E27FC236}">
-                    <a16:creationId xmlns:a16="http://schemas.microsoft.com/office/drawing/2014/main" xmlns="" id="{B9A27781-6779-CA48-96CD-3E7F6E6F6CAC}"/>
+                    <a16:creationId xmlns:a16="http://schemas.microsoft.com/office/drawing/2014/main" id="{B9A27781-6779-CA48-96CD-3E7F6E6F6CAC}"/>
                   </a:ext>
                 </a:extLst>
               </p:cNvPr>
@@ -24928,7 +24994,7 @@
                         <m:fPr>
                           <m:ctrlPr>
                             <a:rPr lang="en-US" sz="4000" b="0" i="1" smtClean="0">
-                              <a:latin typeface="Cambria Math" charset="0"/>
+                              <a:latin typeface="Cambria Math" panose="02040503050406030204" pitchFamily="18" charset="0"/>
                             </a:rPr>
                           </m:ctrlPr>
                         </m:fPr>
@@ -24959,7 +25025,7 @@
                               <m:type m:val="skw"/>
                               <m:ctrlPr>
                                 <a:rPr lang="en-US" sz="4000" b="0" i="1" smtClean="0">
-                                  <a:latin typeface="Cambria Math" charset="0"/>
+                                  <a:latin typeface="Cambria Math" panose="02040503050406030204" pitchFamily="18" charset="0"/>
                                   <a:ea typeface="Cambria Math" panose="02040503050406030204" pitchFamily="18" charset="0"/>
                                 </a:rPr>
                               </m:ctrlPr>
@@ -25055,7 +25121,7 @@
               <p:cNvPr id="8" name="TextBox 7">
                 <a:extLst>
                   <a:ext uri="{FF2B5EF4-FFF2-40B4-BE49-F238E27FC236}">
-                    <a16:creationId xmlns:a16="http://schemas.microsoft.com/office/drawing/2014/main" xmlns="" id="{C8402F19-A5A0-3542-B759-AE038D4FA4E7}"/>
+                    <a16:creationId xmlns:a16="http://schemas.microsoft.com/office/drawing/2014/main" id="{C8402F19-A5A0-3542-B759-AE038D4FA4E7}"/>
                   </a:ext>
                 </a:extLst>
               </p:cNvPr>
@@ -25099,7 +25165,7 @@
                             <a:solidFill>
                               <a:schemeClr val="tx2"/>
                             </a:solidFill>
-                            <a:latin typeface="Cambria Math" charset="0"/>
+                            <a:latin typeface="Cambria Math" panose="02040503050406030204" pitchFamily="18" charset="0"/>
                           </a:rPr>
                         </m:ctrlPr>
                       </m:sSubPr>
@@ -25419,7 +25485,7 @@
           <p:cNvPr id="10" name="TextBox 9">
             <a:extLst>
               <a:ext uri="{FF2B5EF4-FFF2-40B4-BE49-F238E27FC236}">
-                <a16:creationId xmlns:a16="http://schemas.microsoft.com/office/drawing/2014/main" xmlns="" id="{62E219FA-28DD-894F-B184-C72CAF779949}"/>
+                <a16:creationId xmlns:a16="http://schemas.microsoft.com/office/drawing/2014/main" id="{62E219FA-28DD-894F-B184-C72CAF779949}"/>
               </a:ext>
             </a:extLst>
           </p:cNvPr>
@@ -25480,7 +25546,7 @@
           <p:cNvPr id="6" name="Rectangle 5">
             <a:extLst>
               <a:ext uri="{FF2B5EF4-FFF2-40B4-BE49-F238E27FC236}">
-                <a16:creationId xmlns:a16="http://schemas.microsoft.com/office/drawing/2014/main" xmlns="" id="{40CA9FB1-CC4C-2949-843D-D8D012B694A5}"/>
+                <a16:creationId xmlns:a16="http://schemas.microsoft.com/office/drawing/2014/main" id="{40CA9FB1-CC4C-2949-843D-D8D012B694A5}"/>
               </a:ext>
             </a:extLst>
           </p:cNvPr>
@@ -25527,7 +25593,7 @@
               <p:cNvPr id="4" name="TextBox 3">
                 <a:extLst>
                   <a:ext uri="{FF2B5EF4-FFF2-40B4-BE49-F238E27FC236}">
-                    <a16:creationId xmlns:a16="http://schemas.microsoft.com/office/drawing/2014/main" xmlns="" id="{D87BE456-96CB-BC4C-B6B3-4AD36BD17D9E}"/>
+                    <a16:creationId xmlns:a16="http://schemas.microsoft.com/office/drawing/2014/main" id="{D87BE456-96CB-BC4C-B6B3-4AD36BD17D9E}"/>
                   </a:ext>
                 </a:extLst>
               </p:cNvPr>
@@ -25582,7 +25648,7 @@
                               <a:solidFill>
                                 <a:schemeClr val="accent6"/>
                               </a:solidFill>
-                              <a:latin typeface="Cambria Math" charset="0"/>
+                              <a:latin typeface="Cambria Math" panose="02040503050406030204" pitchFamily="18" charset="0"/>
                             </a:rPr>
                           </m:ctrlPr>
                         </m:fPr>
@@ -25689,7 +25755,7 @@
           <p:cNvPr id="7" name="Table 6">
             <a:extLst>
               <a:ext uri="{FF2B5EF4-FFF2-40B4-BE49-F238E27FC236}">
-                <a16:creationId xmlns:a16="http://schemas.microsoft.com/office/drawing/2014/main" xmlns="" id="{0E60F6F4-904B-5E4C-BA9A-6719B53D6AF3}"/>
+                <a16:creationId xmlns:a16="http://schemas.microsoft.com/office/drawing/2014/main" id="{0E60F6F4-904B-5E4C-BA9A-6719B53D6AF3}"/>
               </a:ext>
             </a:extLst>
           </p:cNvPr>
@@ -25712,14 +25778,14 @@
                 <a:gridCol w="2286000">
                   <a:extLst>
                     <a:ext uri="{9D8B030D-6E8A-4147-A177-3AD203B41FA5}">
-                      <a16:colId xmlns:a16="http://schemas.microsoft.com/office/drawing/2014/main" xmlns="" val="2004006104"/>
+                      <a16:colId xmlns:a16="http://schemas.microsoft.com/office/drawing/2014/main" val="2004006104"/>
                     </a:ext>
                   </a:extLst>
                 </a:gridCol>
                 <a:gridCol w="5359400">
                   <a:extLst>
                     <a:ext uri="{9D8B030D-6E8A-4147-A177-3AD203B41FA5}">
-                      <a16:colId xmlns:a16="http://schemas.microsoft.com/office/drawing/2014/main" xmlns="" val="2605256838"/>
+                      <a16:colId xmlns:a16="http://schemas.microsoft.com/office/drawing/2014/main" val="2605256838"/>
                     </a:ext>
                   </a:extLst>
                 </a:gridCol>
@@ -25755,7 +25821,7 @@
                 </a:tc>
                 <a:extLst>
                   <a:ext uri="{0D108BD9-81ED-4DB2-BD59-A6C34878D82A}">
-                    <a16:rowId xmlns:a16="http://schemas.microsoft.com/office/drawing/2014/main" xmlns="" val="4057194693"/>
+                    <a16:rowId xmlns:a16="http://schemas.microsoft.com/office/drawing/2014/main" val="4057194693"/>
                   </a:ext>
                 </a:extLst>
               </a:tr>
@@ -25790,7 +25856,7 @@
                 </a:tc>
                 <a:extLst>
                   <a:ext uri="{0D108BD9-81ED-4DB2-BD59-A6C34878D82A}">
-                    <a16:rowId xmlns:a16="http://schemas.microsoft.com/office/drawing/2014/main" xmlns="" val="2017861069"/>
+                    <a16:rowId xmlns:a16="http://schemas.microsoft.com/office/drawing/2014/main" val="2017861069"/>
                   </a:ext>
                 </a:extLst>
               </a:tr>
@@ -25825,7 +25891,7 @@
                 </a:tc>
                 <a:extLst>
                   <a:ext uri="{0D108BD9-81ED-4DB2-BD59-A6C34878D82A}">
-                    <a16:rowId xmlns:a16="http://schemas.microsoft.com/office/drawing/2014/main" xmlns="" val="1515990545"/>
+                    <a16:rowId xmlns:a16="http://schemas.microsoft.com/office/drawing/2014/main" val="1515990545"/>
                   </a:ext>
                 </a:extLst>
               </a:tr>
@@ -25860,7 +25926,7 @@
                 </a:tc>
                 <a:extLst>
                   <a:ext uri="{0D108BD9-81ED-4DB2-BD59-A6C34878D82A}">
-                    <a16:rowId xmlns:a16="http://schemas.microsoft.com/office/drawing/2014/main" xmlns="" val="2158851004"/>
+                    <a16:rowId xmlns:a16="http://schemas.microsoft.com/office/drawing/2014/main" val="2158851004"/>
                   </a:ext>
                 </a:extLst>
               </a:tr>
@@ -26045,7 +26111,7 @@
           <p:cNvPr id="10" name="TextBox 9">
             <a:extLst>
               <a:ext uri="{FF2B5EF4-FFF2-40B4-BE49-F238E27FC236}">
-                <a16:creationId xmlns:a16="http://schemas.microsoft.com/office/drawing/2014/main" xmlns="" id="{62E219FA-28DD-894F-B184-C72CAF779949}"/>
+                <a16:creationId xmlns:a16="http://schemas.microsoft.com/office/drawing/2014/main" id="{62E219FA-28DD-894F-B184-C72CAF779949}"/>
               </a:ext>
             </a:extLst>
           </p:cNvPr>
@@ -26087,7 +26153,7 @@
           <p:cNvPr id="6" name="Rectangle 5">
             <a:extLst>
               <a:ext uri="{FF2B5EF4-FFF2-40B4-BE49-F238E27FC236}">
-                <a16:creationId xmlns:a16="http://schemas.microsoft.com/office/drawing/2014/main" xmlns="" id="{BC1B028F-F67A-D147-BB84-EBBFC34336ED}"/>
+                <a16:creationId xmlns:a16="http://schemas.microsoft.com/office/drawing/2014/main" id="{BC1B028F-F67A-D147-BB84-EBBFC34336ED}"/>
               </a:ext>
             </a:extLst>
           </p:cNvPr>
@@ -26132,7 +26198,7 @@
           <p:cNvPr id="7" name="TextBox 6">
             <a:extLst>
               <a:ext uri="{FF2B5EF4-FFF2-40B4-BE49-F238E27FC236}">
-                <a16:creationId xmlns:a16="http://schemas.microsoft.com/office/drawing/2014/main" xmlns="" id="{1DB1F116-D28F-334E-893D-8C3EF434488B}"/>
+                <a16:creationId xmlns:a16="http://schemas.microsoft.com/office/drawing/2014/main" id="{1DB1F116-D28F-334E-893D-8C3EF434488B}"/>
               </a:ext>
             </a:extLst>
           </p:cNvPr>
@@ -26371,7 +26437,7 @@
               <p:cNvPr id="10" name="TextBox 9">
                 <a:extLst>
                   <a:ext uri="{FF2B5EF4-FFF2-40B4-BE49-F238E27FC236}">
-                    <a16:creationId xmlns:a16="http://schemas.microsoft.com/office/drawing/2014/main" xmlns="" id="{62E219FA-28DD-894F-B184-C72CAF779949}"/>
+                    <a16:creationId xmlns:a16="http://schemas.microsoft.com/office/drawing/2014/main" id="{62E219FA-28DD-894F-B184-C72CAF779949}"/>
                   </a:ext>
                 </a:extLst>
               </p:cNvPr>
@@ -26424,7 +26490,7 @@
                             <a:solidFill>
                               <a:schemeClr val="tx2"/>
                             </a:solidFill>
-                            <a:latin typeface="Cambria Math" charset="0"/>
+                            <a:latin typeface="Cambria Math" panose="02040503050406030204" pitchFamily="18" charset="0"/>
                             <a:ea typeface="Consolas" charset="0"/>
                             <a:cs typeface="Consolas" charset="0"/>
                           </a:rPr>
@@ -26767,7 +26833,7 @@
           <p:cNvPr id="4" name="Rectangle 3">
             <a:extLst>
               <a:ext uri="{FF2B5EF4-FFF2-40B4-BE49-F238E27FC236}">
-                <a16:creationId xmlns:a16="http://schemas.microsoft.com/office/drawing/2014/main" xmlns="" id="{5190B6BE-E3DE-924F-85E2-4454C0BEA015}"/>
+                <a16:creationId xmlns:a16="http://schemas.microsoft.com/office/drawing/2014/main" id="{5190B6BE-E3DE-924F-85E2-4454C0BEA015}"/>
               </a:ext>
             </a:extLst>
           </p:cNvPr>
@@ -27212,7 +27278,7 @@
               <p:cNvPr id="7" name="TextBox 6">
                 <a:extLst>
                   <a:ext uri="{FF2B5EF4-FFF2-40B4-BE49-F238E27FC236}">
-                    <a16:creationId xmlns:a16="http://schemas.microsoft.com/office/drawing/2014/main" xmlns="" id="{48CE934A-05EB-A141-80B0-F32AD9B7BD11}"/>
+                    <a16:creationId xmlns:a16="http://schemas.microsoft.com/office/drawing/2014/main" id="{48CE934A-05EB-A141-80B0-F32AD9B7BD11}"/>
                   </a:ext>
                 </a:extLst>
               </p:cNvPr>
@@ -27246,7 +27312,7 @@
                         <m:sSubPr>
                           <m:ctrlPr>
                             <a:rPr lang="en-US" sz="3600" b="0" i="1" smtClean="0">
-                              <a:latin typeface="Cambria Math" charset="0"/>
+                              <a:latin typeface="Cambria Math" panose="02040503050406030204" pitchFamily="18" charset="0"/>
                             </a:rPr>
                           </m:ctrlPr>
                         </m:sSubPr>
@@ -27283,7 +27349,7 @@
                         <m:fPr>
                           <m:ctrlPr>
                             <a:rPr lang="en-US" sz="3600" b="0" i="1" smtClean="0">
-                              <a:latin typeface="Cambria Math" charset="0"/>
+                              <a:latin typeface="Cambria Math" panose="02040503050406030204" pitchFamily="18" charset="0"/>
                             </a:rPr>
                           </m:ctrlPr>
                         </m:fPr>
@@ -27377,7 +27443,7 @@
               <p:cNvPr id="6" name="TextBox 5">
                 <a:extLst>
                   <a:ext uri="{FF2B5EF4-FFF2-40B4-BE49-F238E27FC236}">
-                    <a16:creationId xmlns:a16="http://schemas.microsoft.com/office/drawing/2014/main" xmlns="" id="{ED999DE1-6C56-CF4C-B508-3AE9F297BB60}"/>
+                    <a16:creationId xmlns:a16="http://schemas.microsoft.com/office/drawing/2014/main" id="{ED999DE1-6C56-CF4C-B508-3AE9F297BB60}"/>
                   </a:ext>
                 </a:extLst>
               </p:cNvPr>
@@ -27423,7 +27489,7 @@
                         <m:fPr>
                           <m:ctrlPr>
                             <a:rPr lang="en-US" sz="3600" b="0" i="1" smtClean="0">
-                              <a:latin typeface="Cambria Math" charset="0"/>
+                              <a:latin typeface="Cambria Math" panose="02040503050406030204" pitchFamily="18" charset="0"/>
                             </a:rPr>
                           </m:ctrlPr>
                         </m:fPr>
@@ -27442,7 +27508,7 @@
                               <m:degHide m:val="on"/>
                               <m:ctrlPr>
                                 <a:rPr lang="en-US" sz="3600" b="0" i="1" smtClean="0">
-                                  <a:latin typeface="Cambria Math" charset="0"/>
+                                  <a:latin typeface="Cambria Math" panose="02040503050406030204" pitchFamily="18" charset="0"/>
                                 </a:rPr>
                               </m:ctrlPr>
                             </m:radPr>
@@ -27516,7 +27582,7 @@
           <p:cNvPr id="3" name="Rectangle 2">
             <a:extLst>
               <a:ext uri="{FF2B5EF4-FFF2-40B4-BE49-F238E27FC236}">
-                <a16:creationId xmlns:a16="http://schemas.microsoft.com/office/drawing/2014/main" xmlns="" id="{07D9BB3E-BFF5-F442-9702-6120A6B69ADC}"/>
+                <a16:creationId xmlns:a16="http://schemas.microsoft.com/office/drawing/2014/main" id="{07D9BB3E-BFF5-F442-9702-6120A6B69ADC}"/>
               </a:ext>
             </a:extLst>
           </p:cNvPr>
@@ -27955,6 +28021,220 @@
 </p:sld>
 </file>
 
+<file path=ppt/slides/slide52.xml><?xml version="1.0" encoding="utf-8"?>
+<p:sld xmlns:a="http://schemas.openxmlformats.org/drawingml/2006/main" xmlns:r="http://schemas.openxmlformats.org/officeDocument/2006/relationships" xmlns:p="http://schemas.openxmlformats.org/presentationml/2006/main">
+  <p:cSld>
+    <p:spTree>
+      <p:nvGrpSpPr>
+        <p:cNvPr id="1" name=""/>
+        <p:cNvGrpSpPr/>
+        <p:nvPr/>
+      </p:nvGrpSpPr>
+      <p:grpSpPr>
+        <a:xfrm>
+          <a:off x="0" y="0"/>
+          <a:ext cx="0" cy="0"/>
+          <a:chOff x="0" y="0"/>
+          <a:chExt cx="0" cy="0"/>
+        </a:xfrm>
+      </p:grpSpPr>
+      <p:sp>
+        <p:nvSpPr>
+          <p:cNvPr id="4" name="Rectangle 3"/>
+          <p:cNvSpPr/>
+          <p:nvPr/>
+        </p:nvSpPr>
+        <p:spPr>
+          <a:xfrm>
+            <a:off x="389164" y="1376803"/>
+            <a:ext cx="11413671" cy="1446550"/>
+          </a:xfrm>
+          <a:prstGeom prst="rect">
+            <a:avLst/>
+          </a:prstGeom>
+        </p:spPr>
+        <p:txBody>
+          <a:bodyPr wrap="square">
+            <a:spAutoFit/>
+          </a:bodyPr>
+          <a:lstStyle/>
+          <a:p>
+            <a:pPr algn="ctr"/>
+            <a:r>
+              <a:rPr lang="en-US" sz="8800" b="1" dirty="0">
+                <a:solidFill>
+                  <a:schemeClr val="accent3"/>
+                </a:solidFill>
+                <a:latin typeface="Consolas" charset="0"/>
+                <a:ea typeface="Consolas" charset="0"/>
+                <a:cs typeface="Consolas" charset="0"/>
+              </a:rPr>
+              <a:t>Application</a:t>
+            </a:r>
+            <a:endParaRPr lang="en-US" sz="8800" dirty="0">
+              <a:solidFill>
+                <a:schemeClr val="accent6"/>
+              </a:solidFill>
+            </a:endParaRPr>
+          </a:p>
+        </p:txBody>
+      </p:sp>
+      <p:sp>
+        <p:nvSpPr>
+          <p:cNvPr id="2" name="Slide Number Placeholder 1"/>
+          <p:cNvSpPr>
+            <a:spLocks noGrp="1"/>
+          </p:cNvSpPr>
+          <p:nvPr>
+            <p:ph type="sldNum" sz="quarter" idx="12"/>
+          </p:nvPr>
+        </p:nvSpPr>
+        <p:spPr/>
+        <p:txBody>
+          <a:bodyPr/>
+          <a:lstStyle/>
+          <a:p>
+            <a:fld id="{4655F2EB-082D-1A4D-B2FA-EA5F6FE60629}" type="slidenum">
+              <a:rPr lang="en-US" smtClean="0"/>
+              <a:t>52</a:t>
+            </a:fld>
+            <a:endParaRPr lang="en-US" dirty="0"/>
+          </a:p>
+        </p:txBody>
+      </p:sp>
+      <p:sp>
+        <p:nvSpPr>
+          <p:cNvPr id="5" name="TextBox 4">
+            <a:extLst>
+              <a:ext uri="{FF2B5EF4-FFF2-40B4-BE49-F238E27FC236}">
+                <a16:creationId xmlns:a16="http://schemas.microsoft.com/office/drawing/2014/main" id="{60CEC2E2-D008-C344-8F8F-FA885E3438A9}"/>
+              </a:ext>
+            </a:extLst>
+          </p:cNvPr>
+          <p:cNvSpPr txBox="1"/>
+          <p:nvPr/>
+        </p:nvSpPr>
+        <p:spPr>
+          <a:xfrm>
+            <a:off x="3914151" y="2782669"/>
+            <a:ext cx="4363695" cy="646331"/>
+          </a:xfrm>
+          <a:prstGeom prst="rect">
+            <a:avLst/>
+          </a:prstGeom>
+          <a:noFill/>
+        </p:spPr>
+        <p:txBody>
+          <a:bodyPr wrap="none" rtlCol="0">
+            <a:spAutoFit/>
+          </a:bodyPr>
+          <a:lstStyle/>
+          <a:p>
+            <a:pPr algn="ctr"/>
+            <a:r>
+              <a:rPr lang="en-US" b="1" dirty="0">
+                <a:solidFill>
+                  <a:schemeClr val="accent6"/>
+                </a:solidFill>
+                <a:latin typeface="Consolas" panose="020B0609020204030204" pitchFamily="49" charset="0"/>
+                <a:cs typeface="Consolas" panose="020B0609020204030204" pitchFamily="49" charset="0"/>
+              </a:rPr>
+              <a:t>Example Using the Class Data &amp;</a:t>
+            </a:r>
+          </a:p>
+          <a:p>
+            <a:pPr algn="ctr"/>
+            <a:r>
+              <a:rPr lang="en-US" b="1" dirty="0">
+                <a:solidFill>
+                  <a:schemeClr val="accent6"/>
+                </a:solidFill>
+                <a:latin typeface="Consolas" panose="020B0609020204030204" pitchFamily="49" charset="0"/>
+                <a:cs typeface="Consolas" panose="020B0609020204030204" pitchFamily="49" charset="0"/>
+              </a:rPr>
+              <a:t>The Office/Parks and Rec Data Set</a:t>
+            </a:r>
+          </a:p>
+        </p:txBody>
+      </p:sp>
+      <p:sp>
+        <p:nvSpPr>
+          <p:cNvPr id="7" name="TextBox 6">
+            <a:extLst>
+              <a:ext uri="{FF2B5EF4-FFF2-40B4-BE49-F238E27FC236}">
+                <a16:creationId xmlns:a16="http://schemas.microsoft.com/office/drawing/2014/main" id="{1DE3B548-4D66-7440-B0BD-5D47B9C75724}"/>
+              </a:ext>
+            </a:extLst>
+          </p:cNvPr>
+          <p:cNvSpPr txBox="1"/>
+          <p:nvPr/>
+        </p:nvSpPr>
+        <p:spPr>
+          <a:xfrm>
+            <a:off x="4167443" y="4489456"/>
+            <a:ext cx="3857145" cy="646331"/>
+          </a:xfrm>
+          <a:prstGeom prst="rect">
+            <a:avLst/>
+          </a:prstGeom>
+          <a:solidFill>
+            <a:schemeClr val="accent6">
+              <a:lumMod val="50000"/>
+            </a:schemeClr>
+          </a:solidFill>
+        </p:spPr>
+        <p:txBody>
+          <a:bodyPr wrap="none" rtlCol="0">
+            <a:spAutoFit/>
+          </a:bodyPr>
+          <a:lstStyle/>
+          <a:p>
+            <a:pPr algn="ctr"/>
+            <a:r>
+              <a:rPr lang="en-US" b="1" dirty="0">
+                <a:solidFill>
+                  <a:schemeClr val="accent6">
+                    <a:lumMod val="20000"/>
+                    <a:lumOff val="80000"/>
+                  </a:schemeClr>
+                </a:solidFill>
+                <a:latin typeface="Consolas" panose="020B0609020204030204" pitchFamily="49" charset="0"/>
+                <a:cs typeface="Consolas" panose="020B0609020204030204" pitchFamily="49" charset="0"/>
+              </a:rPr>
+              <a:t>Full Hypothesis Test Example </a:t>
+            </a:r>
+          </a:p>
+          <a:p>
+            <a:pPr algn="ctr"/>
+            <a:r>
+              <a:rPr lang="en-US" b="1" dirty="0">
+                <a:solidFill>
+                  <a:schemeClr val="accent6">
+                    <a:lumMod val="20000"/>
+                    <a:lumOff val="80000"/>
+                  </a:schemeClr>
+                </a:solidFill>
+                <a:latin typeface="Consolas" panose="020B0609020204030204" pitchFamily="49" charset="0"/>
+                <a:cs typeface="Consolas" panose="020B0609020204030204" pitchFamily="49" charset="0"/>
+              </a:rPr>
+              <a:t>(outside of Jamovi)</a:t>
+            </a:r>
+          </a:p>
+        </p:txBody>
+      </p:sp>
+    </p:spTree>
+    <p:extLst>
+      <p:ext uri="{BB962C8B-B14F-4D97-AF65-F5344CB8AC3E}">
+        <p14:creationId xmlns:p14="http://schemas.microsoft.com/office/powerpoint/2010/main" val="2529882464"/>
+      </p:ext>
+    </p:extLst>
+  </p:cSld>
+  <p:clrMapOvr>
+    <a:masterClrMapping/>
+  </p:clrMapOvr>
+</p:sld>
+</file>
+
 <file path=ppt/slides/slide6.xml><?xml version="1.0" encoding="utf-8"?>
 <p:sld xmlns:a="http://schemas.openxmlformats.org/drawingml/2006/main" xmlns:r="http://schemas.openxmlformats.org/officeDocument/2006/relationships" xmlns:p="http://schemas.openxmlformats.org/presentationml/2006/main">
   <p:cSld>
@@ -28037,7 +28317,7 @@
           <p:cNvPr id="4" name="Picture 3">
             <a:extLst>
               <a:ext uri="{FF2B5EF4-FFF2-40B4-BE49-F238E27FC236}">
-                <a16:creationId xmlns:a16="http://schemas.microsoft.com/office/drawing/2014/main" xmlns="" id="{EF78F04A-1531-3E41-AD61-4C083AE886C7}"/>
+                <a16:creationId xmlns:a16="http://schemas.microsoft.com/office/drawing/2014/main" id="{EF78F04A-1531-3E41-AD61-4C083AE886C7}"/>
               </a:ext>
             </a:extLst>
           </p:cNvPr>
@@ -28066,7 +28346,7 @@
           <p:cNvPr id="6" name="Rectangle 5">
             <a:extLst>
               <a:ext uri="{FF2B5EF4-FFF2-40B4-BE49-F238E27FC236}">
-                <a16:creationId xmlns:a16="http://schemas.microsoft.com/office/drawing/2014/main" xmlns="" id="{53DFA3D4-C8AF-D049-9559-57617E32D531}"/>
+                <a16:creationId xmlns:a16="http://schemas.microsoft.com/office/drawing/2014/main" id="{53DFA3D4-C8AF-D049-9559-57617E32D531}"/>
               </a:ext>
             </a:extLst>
           </p:cNvPr>
@@ -28186,7 +28466,7 @@
           <p:cNvPr id="10" name="TextBox 9">
             <a:extLst>
               <a:ext uri="{FF2B5EF4-FFF2-40B4-BE49-F238E27FC236}">
-                <a16:creationId xmlns:a16="http://schemas.microsoft.com/office/drawing/2014/main" xmlns="" id="{62E219FA-28DD-894F-B184-C72CAF779949}"/>
+                <a16:creationId xmlns:a16="http://schemas.microsoft.com/office/drawing/2014/main" id="{62E219FA-28DD-894F-B184-C72CAF779949}"/>
               </a:ext>
             </a:extLst>
           </p:cNvPr>
@@ -28311,7 +28591,7 @@
           <p:cNvPr id="3" name="Rectangle 2">
             <a:extLst>
               <a:ext uri="{FF2B5EF4-FFF2-40B4-BE49-F238E27FC236}">
-                <a16:creationId xmlns:a16="http://schemas.microsoft.com/office/drawing/2014/main" xmlns="" id="{105E7469-6DC1-C542-A3A0-2B60CBF260BB}"/>
+                <a16:creationId xmlns:a16="http://schemas.microsoft.com/office/drawing/2014/main" id="{105E7469-6DC1-C542-A3A0-2B60CBF260BB}"/>
               </a:ext>
             </a:extLst>
           </p:cNvPr>
@@ -28853,7 +29133,7 @@
           <p:cNvPr id="4" name="Rectangle 3">
             <a:extLst>
               <a:ext uri="{FF2B5EF4-FFF2-40B4-BE49-F238E27FC236}">
-                <a16:creationId xmlns:a16="http://schemas.microsoft.com/office/drawing/2014/main" xmlns="" id="{1081156F-B192-4F4B-BCB9-09E835E6A1C1}"/>
+                <a16:creationId xmlns:a16="http://schemas.microsoft.com/office/drawing/2014/main" id="{1081156F-B192-4F4B-BCB9-09E835E6A1C1}"/>
               </a:ext>
             </a:extLst>
           </p:cNvPr>
@@ -28898,7 +29178,7 @@
           <p:cNvPr id="6" name="Rectangle 5">
             <a:extLst>
               <a:ext uri="{FF2B5EF4-FFF2-40B4-BE49-F238E27FC236}">
-                <a16:creationId xmlns:a16="http://schemas.microsoft.com/office/drawing/2014/main" xmlns="" id="{D5546DBD-7AD3-7842-B4F4-E45A849E60BB}"/>
+                <a16:creationId xmlns:a16="http://schemas.microsoft.com/office/drawing/2014/main" id="{D5546DBD-7AD3-7842-B4F4-E45A849E60BB}"/>
               </a:ext>
             </a:extLst>
           </p:cNvPr>
@@ -28944,7 +29224,7 @@
           <p:cNvPr id="8" name="Rectangle 7">
             <a:extLst>
               <a:ext uri="{FF2B5EF4-FFF2-40B4-BE49-F238E27FC236}">
-                <a16:creationId xmlns:a16="http://schemas.microsoft.com/office/drawing/2014/main" xmlns="" id="{5DED8DBF-5018-3743-AFB8-00DE5C7323E6}"/>
+                <a16:creationId xmlns:a16="http://schemas.microsoft.com/office/drawing/2014/main" id="{5DED8DBF-5018-3743-AFB8-00DE5C7323E6}"/>
               </a:ext>
             </a:extLst>
           </p:cNvPr>
@@ -29168,7 +29448,7 @@
           <p:cNvPr id="4" name="Rectangle 3">
             <a:extLst>
               <a:ext uri="{FF2B5EF4-FFF2-40B4-BE49-F238E27FC236}">
-                <a16:creationId xmlns:a16="http://schemas.microsoft.com/office/drawing/2014/main" xmlns="" id="{1081156F-B192-4F4B-BCB9-09E835E6A1C1}"/>
+                <a16:creationId xmlns:a16="http://schemas.microsoft.com/office/drawing/2014/main" id="{1081156F-B192-4F4B-BCB9-09E835E6A1C1}"/>
               </a:ext>
             </a:extLst>
           </p:cNvPr>
@@ -29213,7 +29493,7 @@
           <p:cNvPr id="6" name="Rectangle 5">
             <a:extLst>
               <a:ext uri="{FF2B5EF4-FFF2-40B4-BE49-F238E27FC236}">
-                <a16:creationId xmlns:a16="http://schemas.microsoft.com/office/drawing/2014/main" xmlns="" id="{D5546DBD-7AD3-7842-B4F4-E45A849E60BB}"/>
+                <a16:creationId xmlns:a16="http://schemas.microsoft.com/office/drawing/2014/main" id="{D5546DBD-7AD3-7842-B4F4-E45A849E60BB}"/>
               </a:ext>
             </a:extLst>
           </p:cNvPr>
@@ -29259,7 +29539,7 @@
           <p:cNvPr id="8" name="Rectangle 7">
             <a:extLst>
               <a:ext uri="{FF2B5EF4-FFF2-40B4-BE49-F238E27FC236}">
-                <a16:creationId xmlns:a16="http://schemas.microsoft.com/office/drawing/2014/main" xmlns="" id="{5DED8DBF-5018-3743-AFB8-00DE5C7323E6}"/>
+                <a16:creationId xmlns:a16="http://schemas.microsoft.com/office/drawing/2014/main" id="{5DED8DBF-5018-3743-AFB8-00DE5C7323E6}"/>
               </a:ext>
             </a:extLst>
           </p:cNvPr>
@@ -29365,7 +29645,7 @@
           <p:cNvPr id="7" name="Rectangle 6">
             <a:extLst>
               <a:ext uri="{FF2B5EF4-FFF2-40B4-BE49-F238E27FC236}">
-                <a16:creationId xmlns:a16="http://schemas.microsoft.com/office/drawing/2014/main" xmlns="" id="{31A2AE59-7DF8-0D44-9E88-92B8B5D75359}"/>
+                <a16:creationId xmlns:a16="http://schemas.microsoft.com/office/drawing/2014/main" id="{31A2AE59-7DF8-0D44-9E88-92B8B5D75359}"/>
               </a:ext>
             </a:extLst>
           </p:cNvPr>
@@ -29444,7 +29724,7 @@
           <p:cNvPr id="3" name="Bent-Up Arrow 2">
             <a:extLst>
               <a:ext uri="{FF2B5EF4-FFF2-40B4-BE49-F238E27FC236}">
-                <a16:creationId xmlns:a16="http://schemas.microsoft.com/office/drawing/2014/main" xmlns="" id="{50A25689-570B-BD49-972E-8E45FE19DD9D}"/>
+                <a16:creationId xmlns:a16="http://schemas.microsoft.com/office/drawing/2014/main" id="{50A25689-570B-BD49-972E-8E45FE19DD9D}"/>
               </a:ext>
             </a:extLst>
           </p:cNvPr>

</xml_diff>